<commit_message>
add sessions 6-9 (xd)
</commit_message>
<xml_diff>
--- a/da-6823-902-data-analytics-practicum-I/session3/gretl arima part 1 final.pptx
+++ b/da-6823-902-data-analytics-practicum-I/session3/gretl arima part 1 final.pptx
@@ -601,35 +601,35 @@
           <a:p>
             <a:pPr lvl="0"/>
             <a:r>
-              <a:rPr lang="en-US" noProof="0" smtClean="0"/>
+              <a:rPr lang="en-US" noProof="0"/>
               <a:t>Click to edit Master text styles</a:t>
             </a:r>
           </a:p>
           <a:p>
             <a:pPr lvl="1"/>
             <a:r>
-              <a:rPr lang="en-US" noProof="0" smtClean="0"/>
+              <a:rPr lang="en-US" noProof="0"/>
               <a:t>Second level</a:t>
             </a:r>
           </a:p>
           <a:p>
             <a:pPr lvl="2"/>
             <a:r>
-              <a:rPr lang="en-US" noProof="0" smtClean="0"/>
+              <a:rPr lang="en-US" noProof="0"/>
               <a:t>Third level</a:t>
             </a:r>
           </a:p>
           <a:p>
             <a:pPr lvl="3"/>
             <a:r>
-              <a:rPr lang="en-US" noProof="0" smtClean="0"/>
+              <a:rPr lang="en-US" noProof="0"/>
               <a:t>Fourth level</a:t>
             </a:r>
           </a:p>
           <a:p>
             <a:pPr lvl="4"/>
             <a:r>
-              <a:rPr lang="en-US" noProof="0" smtClean="0"/>
+              <a:rPr lang="en-US" noProof="0"/>
               <a:t>Fifth level</a:t>
             </a:r>
           </a:p>
@@ -906,7 +906,7 @@
               <a:pPr/>
               <a:t>1</a:t>
             </a:fld>
-            <a:endParaRPr lang="en-US" smtClean="0"/>
+            <a:endParaRPr lang="en-US"/>
           </a:p>
         </p:txBody>
       </p:sp>
@@ -943,7 +943,7 @@
           <a:lstStyle/>
           <a:p>
             <a:pPr eaLnBrk="1" hangingPunct="1"/>
-            <a:endParaRPr lang="en-US" smtClean="0"/>
+            <a:endParaRPr lang="en-US"/>
           </a:p>
         </p:txBody>
       </p:sp>
@@ -999,7 +999,7 @@
               <a:pPr/>
               <a:t>6</a:t>
             </a:fld>
-            <a:endParaRPr lang="en-US" smtClean="0"/>
+            <a:endParaRPr lang="en-US"/>
           </a:p>
         </p:txBody>
       </p:sp>
@@ -1036,7 +1036,7 @@
           <a:lstStyle/>
           <a:p>
             <a:pPr eaLnBrk="1" hangingPunct="1"/>
-            <a:endParaRPr lang="en-US" smtClean="0"/>
+            <a:endParaRPr lang="en-US"/>
           </a:p>
         </p:txBody>
       </p:sp>
@@ -1092,7 +1092,7 @@
               <a:pPr/>
               <a:t>8</a:t>
             </a:fld>
-            <a:endParaRPr lang="en-US" smtClean="0"/>
+            <a:endParaRPr lang="en-US"/>
           </a:p>
         </p:txBody>
       </p:sp>
@@ -1129,7 +1129,7 @@
           <a:lstStyle/>
           <a:p>
             <a:pPr eaLnBrk="1" hangingPunct="1"/>
-            <a:endParaRPr lang="en-US" smtClean="0"/>
+            <a:endParaRPr lang="en-US"/>
           </a:p>
         </p:txBody>
       </p:sp>
@@ -1185,7 +1185,7 @@
               <a:pPr/>
               <a:t>9</a:t>
             </a:fld>
-            <a:endParaRPr lang="en-US" smtClean="0"/>
+            <a:endParaRPr lang="en-US"/>
           </a:p>
         </p:txBody>
       </p:sp>
@@ -1223,7 +1223,7 @@
           <a:p>
             <a:pPr eaLnBrk="1" hangingPunct="1"/>
             <a:r>
-              <a:rPr lang="en-US" smtClean="0"/>
+              <a:rPr lang="en-US"/>
               <a:t>If students will be required to write a research proposal or conduct a study as a course project, or if students have ongoing research projects such as theses or dissertations, and if the class is reasonably small, it may be useful to elicit descriptions of their research interests early in the course and use these research questions as a focus for discussion. If the class is large or students do not have well defined research interests, you may want to focus discussion on the empirical examples presented in the chapter.</a:t>
             </a:r>
           </a:p>
@@ -1407,10 +1407,9 @@
           </a:lstStyle>
           <a:p>
             <a:r>
-              <a:rPr kumimoji="0" lang="en-US" smtClean="0"/>
+              <a:rPr kumimoji="0" lang="en-US"/>
               <a:t>Click to edit Master subtitle style</a:t>
             </a:r>
-            <a:endParaRPr kumimoji="0" lang="en-US"/>
           </a:p>
         </p:txBody>
       </p:sp>
@@ -1668,10 +1667,9 @@
           </a:lstStyle>
           <a:p>
             <a:r>
-              <a:rPr kumimoji="0" lang="en-US" smtClean="0"/>
+              <a:rPr kumimoji="0" lang="en-US"/>
               <a:t>Click to edit Master title style</a:t>
             </a:r>
-            <a:endParaRPr kumimoji="0" lang="en-US"/>
           </a:p>
         </p:txBody>
       </p:sp>
@@ -1716,10 +1714,9 @@
           <a:lstStyle/>
           <a:p>
             <a:r>
-              <a:rPr kumimoji="0" lang="en-US" smtClean="0"/>
+              <a:rPr kumimoji="0" lang="en-US"/>
               <a:t>Click to edit Master title style</a:t>
             </a:r>
-            <a:endParaRPr kumimoji="0" lang="en-US"/>
           </a:p>
         </p:txBody>
       </p:sp>
@@ -1740,35 +1737,35 @@
           <a:p>
             <a:pPr lvl="0" eaLnBrk="1" latinLnBrk="0" hangingPunct="1"/>
             <a:r>
-              <a:rPr lang="en-US" smtClean="0"/>
+              <a:rPr lang="en-US"/>
               <a:t>Click to edit Master text styles</a:t>
             </a:r>
           </a:p>
           <a:p>
             <a:pPr lvl="1" eaLnBrk="1" latinLnBrk="0" hangingPunct="1"/>
             <a:r>
-              <a:rPr lang="en-US" smtClean="0"/>
+              <a:rPr lang="en-US"/>
               <a:t>Second level</a:t>
             </a:r>
           </a:p>
           <a:p>
             <a:pPr lvl="2" eaLnBrk="1" latinLnBrk="0" hangingPunct="1"/>
             <a:r>
-              <a:rPr lang="en-US" smtClean="0"/>
+              <a:rPr lang="en-US"/>
               <a:t>Third level</a:t>
             </a:r>
           </a:p>
           <a:p>
             <a:pPr lvl="3" eaLnBrk="1" latinLnBrk="0" hangingPunct="1"/>
             <a:r>
-              <a:rPr lang="en-US" smtClean="0"/>
+              <a:rPr lang="en-US"/>
               <a:t>Fourth level</a:t>
             </a:r>
           </a:p>
           <a:p>
             <a:pPr lvl="4" eaLnBrk="1" latinLnBrk="0" hangingPunct="1"/>
             <a:r>
-              <a:rPr lang="en-US" smtClean="0"/>
+              <a:rPr lang="en-US"/>
               <a:t>Fifth level</a:t>
             </a:r>
             <a:endParaRPr kumimoji="0" lang="en-US"/>
@@ -1894,10 +1891,9 @@
           <a:lstStyle/>
           <a:p>
             <a:r>
-              <a:rPr kumimoji="0" lang="en-US" smtClean="0"/>
+              <a:rPr kumimoji="0" lang="en-US"/>
               <a:t>Click to edit Master title style</a:t>
             </a:r>
-            <a:endParaRPr kumimoji="0" lang="en-US"/>
           </a:p>
         </p:txBody>
       </p:sp>
@@ -1923,35 +1919,35 @@
           <a:p>
             <a:pPr lvl="0" eaLnBrk="1" latinLnBrk="0" hangingPunct="1"/>
             <a:r>
-              <a:rPr lang="en-US" smtClean="0"/>
+              <a:rPr lang="en-US"/>
               <a:t>Click to edit Master text styles</a:t>
             </a:r>
           </a:p>
           <a:p>
             <a:pPr lvl="1" eaLnBrk="1" latinLnBrk="0" hangingPunct="1"/>
             <a:r>
-              <a:rPr lang="en-US" smtClean="0"/>
+              <a:rPr lang="en-US"/>
               <a:t>Second level</a:t>
             </a:r>
           </a:p>
           <a:p>
             <a:pPr lvl="2" eaLnBrk="1" latinLnBrk="0" hangingPunct="1"/>
             <a:r>
-              <a:rPr lang="en-US" smtClean="0"/>
+              <a:rPr lang="en-US"/>
               <a:t>Third level</a:t>
             </a:r>
           </a:p>
           <a:p>
             <a:pPr lvl="3" eaLnBrk="1" latinLnBrk="0" hangingPunct="1"/>
             <a:r>
-              <a:rPr lang="en-US" smtClean="0"/>
+              <a:rPr lang="en-US"/>
               <a:t>Fourth level</a:t>
             </a:r>
           </a:p>
           <a:p>
             <a:pPr lvl="4" eaLnBrk="1" latinLnBrk="0" hangingPunct="1"/>
             <a:r>
-              <a:rPr lang="en-US" smtClean="0"/>
+              <a:rPr lang="en-US"/>
               <a:t>Fifth level</a:t>
             </a:r>
             <a:endParaRPr kumimoji="0" lang="en-US"/>
@@ -2072,10 +2068,9 @@
           <a:lstStyle/>
           <a:p>
             <a:r>
-              <a:rPr kumimoji="0" lang="en-US" smtClean="0"/>
+              <a:rPr kumimoji="0" lang="en-US"/>
               <a:t>Click to edit Master title style</a:t>
             </a:r>
-            <a:endParaRPr kumimoji="0" lang="en-US"/>
           </a:p>
         </p:txBody>
       </p:sp>
@@ -2174,35 +2169,35 @@
           <a:p>
             <a:pPr lvl="0" eaLnBrk="1" latinLnBrk="0" hangingPunct="1"/>
             <a:r>
-              <a:rPr lang="en-US" smtClean="0"/>
+              <a:rPr lang="en-US"/>
               <a:t>Click to edit Master text styles</a:t>
             </a:r>
           </a:p>
           <a:p>
             <a:pPr lvl="1" eaLnBrk="1" latinLnBrk="0" hangingPunct="1"/>
             <a:r>
-              <a:rPr lang="en-US" smtClean="0"/>
+              <a:rPr lang="en-US"/>
               <a:t>Second level</a:t>
             </a:r>
           </a:p>
           <a:p>
             <a:pPr lvl="2" eaLnBrk="1" latinLnBrk="0" hangingPunct="1"/>
             <a:r>
-              <a:rPr lang="en-US" smtClean="0"/>
+              <a:rPr lang="en-US"/>
               <a:t>Third level</a:t>
             </a:r>
           </a:p>
           <a:p>
             <a:pPr lvl="3" eaLnBrk="1" latinLnBrk="0" hangingPunct="1"/>
             <a:r>
-              <a:rPr lang="en-US" smtClean="0"/>
+              <a:rPr lang="en-US"/>
               <a:t>Fourth level</a:t>
             </a:r>
           </a:p>
           <a:p>
             <a:pPr lvl="4" eaLnBrk="1" latinLnBrk="0" hangingPunct="1"/>
             <a:r>
-              <a:rPr lang="en-US" smtClean="0"/>
+              <a:rPr lang="en-US"/>
               <a:t>Fifth level</a:t>
             </a:r>
             <a:endParaRPr kumimoji="0" lang="en-US"/>
@@ -2354,10 +2349,9 @@
           </a:lstStyle>
           <a:p>
             <a:r>
-              <a:rPr kumimoji="0" lang="en-US" smtClean="0"/>
+              <a:rPr kumimoji="0" lang="en-US"/>
               <a:t>Click to edit Master title style</a:t>
             </a:r>
-            <a:endParaRPr kumimoji="0" lang="en-US"/>
           </a:p>
         </p:txBody>
       </p:sp>
@@ -2434,7 +2428,7 @@
           <a:p>
             <a:pPr lvl="0" eaLnBrk="1" latinLnBrk="0" hangingPunct="1"/>
             <a:r>
-              <a:rPr kumimoji="0" lang="en-US" smtClean="0"/>
+              <a:rPr kumimoji="0" lang="en-US"/>
               <a:t>Click to edit Master text styles</a:t>
             </a:r>
           </a:p>
@@ -2706,10 +2700,9 @@
           <a:lstStyle/>
           <a:p>
             <a:r>
-              <a:rPr kumimoji="0" lang="en-US" smtClean="0"/>
+              <a:rPr kumimoji="0" lang="en-US"/>
               <a:t>Click to edit Master title style</a:t>
             </a:r>
-            <a:endParaRPr kumimoji="0" lang="en-US"/>
           </a:p>
         </p:txBody>
       </p:sp>
@@ -2808,35 +2801,35 @@
           <a:p>
             <a:pPr lvl="0" eaLnBrk="1" latinLnBrk="0" hangingPunct="1"/>
             <a:r>
-              <a:rPr lang="en-US" smtClean="0"/>
+              <a:rPr lang="en-US"/>
               <a:t>Click to edit Master text styles</a:t>
             </a:r>
           </a:p>
           <a:p>
             <a:pPr lvl="1" eaLnBrk="1" latinLnBrk="0" hangingPunct="1"/>
             <a:r>
-              <a:rPr lang="en-US" smtClean="0"/>
+              <a:rPr lang="en-US"/>
               <a:t>Second level</a:t>
             </a:r>
           </a:p>
           <a:p>
             <a:pPr lvl="2" eaLnBrk="1" latinLnBrk="0" hangingPunct="1"/>
             <a:r>
-              <a:rPr lang="en-US" smtClean="0"/>
+              <a:rPr lang="en-US"/>
               <a:t>Third level</a:t>
             </a:r>
           </a:p>
           <a:p>
             <a:pPr lvl="3" eaLnBrk="1" latinLnBrk="0" hangingPunct="1"/>
             <a:r>
-              <a:rPr lang="en-US" smtClean="0"/>
+              <a:rPr lang="en-US"/>
               <a:t>Fourth level</a:t>
             </a:r>
           </a:p>
           <a:p>
             <a:pPr lvl="4" eaLnBrk="1" latinLnBrk="0" hangingPunct="1"/>
             <a:r>
-              <a:rPr lang="en-US" smtClean="0"/>
+              <a:rPr lang="en-US"/>
               <a:t>Fifth level</a:t>
             </a:r>
             <a:endParaRPr kumimoji="0" lang="en-US"/>
@@ -2865,35 +2858,35 @@
           <a:p>
             <a:pPr lvl="0" eaLnBrk="1" latinLnBrk="0" hangingPunct="1"/>
             <a:r>
-              <a:rPr lang="en-US" smtClean="0"/>
+              <a:rPr lang="en-US"/>
               <a:t>Click to edit Master text styles</a:t>
             </a:r>
           </a:p>
           <a:p>
             <a:pPr lvl="1" eaLnBrk="1" latinLnBrk="0" hangingPunct="1"/>
             <a:r>
-              <a:rPr lang="en-US" smtClean="0"/>
+              <a:rPr lang="en-US"/>
               <a:t>Second level</a:t>
             </a:r>
           </a:p>
           <a:p>
             <a:pPr lvl="2" eaLnBrk="1" latinLnBrk="0" hangingPunct="1"/>
             <a:r>
-              <a:rPr lang="en-US" smtClean="0"/>
+              <a:rPr lang="en-US"/>
               <a:t>Third level</a:t>
             </a:r>
           </a:p>
           <a:p>
             <a:pPr lvl="3" eaLnBrk="1" latinLnBrk="0" hangingPunct="1"/>
             <a:r>
-              <a:rPr lang="en-US" smtClean="0"/>
+              <a:rPr lang="en-US"/>
               <a:t>Fourth level</a:t>
             </a:r>
           </a:p>
           <a:p>
             <a:pPr lvl="4" eaLnBrk="1" latinLnBrk="0" hangingPunct="1"/>
             <a:r>
-              <a:rPr lang="en-US" smtClean="0"/>
+              <a:rPr lang="en-US"/>
               <a:t>Fifth level</a:t>
             </a:r>
             <a:endParaRPr kumimoji="0" lang="en-US"/>
@@ -2950,10 +2943,9 @@
           </a:lstStyle>
           <a:p>
             <a:r>
-              <a:rPr kumimoji="0" lang="en-US" smtClean="0"/>
+              <a:rPr kumimoji="0" lang="en-US"/>
               <a:t>Click to edit Master title style</a:t>
             </a:r>
-            <a:endParaRPr kumimoji="0" lang="en-US"/>
           </a:p>
         </p:txBody>
       </p:sp>
@@ -3014,7 +3006,7 @@
           <a:p>
             <a:pPr lvl="0" eaLnBrk="1" latinLnBrk="0" hangingPunct="1"/>
             <a:r>
-              <a:rPr kumimoji="0" lang="en-US" smtClean="0"/>
+              <a:rPr kumimoji="0" lang="en-US"/>
               <a:t>Click to edit Master text styles</a:t>
             </a:r>
           </a:p>
@@ -3077,7 +3069,7 @@
           <a:p>
             <a:pPr lvl="0" eaLnBrk="1" latinLnBrk="0" hangingPunct="1"/>
             <a:r>
-              <a:rPr kumimoji="0" lang="en-US" smtClean="0"/>
+              <a:rPr kumimoji="0" lang="en-US"/>
               <a:t>Click to edit Master text styles</a:t>
             </a:r>
           </a:p>
@@ -3178,35 +3170,35 @@
           <a:p>
             <a:pPr lvl="0" eaLnBrk="1" latinLnBrk="0" hangingPunct="1"/>
             <a:r>
-              <a:rPr lang="en-US" smtClean="0"/>
+              <a:rPr lang="en-US"/>
               <a:t>Click to edit Master text styles</a:t>
             </a:r>
           </a:p>
           <a:p>
             <a:pPr lvl="1" eaLnBrk="1" latinLnBrk="0" hangingPunct="1"/>
             <a:r>
-              <a:rPr lang="en-US" smtClean="0"/>
+              <a:rPr lang="en-US"/>
               <a:t>Second level</a:t>
             </a:r>
           </a:p>
           <a:p>
             <a:pPr lvl="2" eaLnBrk="1" latinLnBrk="0" hangingPunct="1"/>
             <a:r>
-              <a:rPr lang="en-US" smtClean="0"/>
+              <a:rPr lang="en-US"/>
               <a:t>Third level</a:t>
             </a:r>
           </a:p>
           <a:p>
             <a:pPr lvl="3" eaLnBrk="1" latinLnBrk="0" hangingPunct="1"/>
             <a:r>
-              <a:rPr lang="en-US" smtClean="0"/>
+              <a:rPr lang="en-US"/>
               <a:t>Fourth level</a:t>
             </a:r>
           </a:p>
           <a:p>
             <a:pPr lvl="4" eaLnBrk="1" latinLnBrk="0" hangingPunct="1"/>
             <a:r>
-              <a:rPr lang="en-US" smtClean="0"/>
+              <a:rPr lang="en-US"/>
               <a:t>Fifth level</a:t>
             </a:r>
             <a:endParaRPr kumimoji="0" lang="en-US"/>
@@ -3235,35 +3227,35 @@
           <a:p>
             <a:pPr lvl="0" eaLnBrk="1" latinLnBrk="0" hangingPunct="1"/>
             <a:r>
-              <a:rPr lang="en-US" smtClean="0"/>
+              <a:rPr lang="en-US"/>
               <a:t>Click to edit Master text styles</a:t>
             </a:r>
           </a:p>
           <a:p>
             <a:pPr lvl="1" eaLnBrk="1" latinLnBrk="0" hangingPunct="1"/>
             <a:r>
-              <a:rPr lang="en-US" smtClean="0"/>
+              <a:rPr lang="en-US"/>
               <a:t>Second level</a:t>
             </a:r>
           </a:p>
           <a:p>
             <a:pPr lvl="2" eaLnBrk="1" latinLnBrk="0" hangingPunct="1"/>
             <a:r>
-              <a:rPr lang="en-US" smtClean="0"/>
+              <a:rPr lang="en-US"/>
               <a:t>Third level</a:t>
             </a:r>
           </a:p>
           <a:p>
             <a:pPr lvl="3" eaLnBrk="1" latinLnBrk="0" hangingPunct="1"/>
             <a:r>
-              <a:rPr lang="en-US" smtClean="0"/>
+              <a:rPr lang="en-US"/>
               <a:t>Fourth level</a:t>
             </a:r>
           </a:p>
           <a:p>
             <a:pPr lvl="4" eaLnBrk="1" latinLnBrk="0" hangingPunct="1"/>
             <a:r>
-              <a:rPr lang="en-US" smtClean="0"/>
+              <a:rPr lang="en-US"/>
               <a:t>Fifth level</a:t>
             </a:r>
             <a:endParaRPr kumimoji="0" lang="en-US"/>
@@ -3311,10 +3303,9 @@
           <a:lstStyle/>
           <a:p>
             <a:r>
-              <a:rPr kumimoji="0" lang="en-US" smtClean="0"/>
+              <a:rPr kumimoji="0" lang="en-US"/>
               <a:t>Click to edit Master title style</a:t>
             </a:r>
-            <a:endParaRPr kumimoji="0" lang="en-US"/>
           </a:p>
         </p:txBody>
       </p:sp>
@@ -3635,10 +3626,9 @@
           </a:lstStyle>
           <a:p>
             <a:r>
-              <a:rPr kumimoji="0" lang="en-US" smtClean="0"/>
+              <a:rPr kumimoji="0" lang="en-US"/>
               <a:t>Click to edit Master title style</a:t>
             </a:r>
-            <a:endParaRPr kumimoji="0" lang="en-US"/>
           </a:p>
         </p:txBody>
       </p:sp>
@@ -3685,7 +3675,7 @@
           <a:p>
             <a:pPr lvl="0" eaLnBrk="1" latinLnBrk="0" hangingPunct="1"/>
             <a:r>
-              <a:rPr kumimoji="0" lang="en-US" smtClean="0"/>
+              <a:rPr kumimoji="0" lang="en-US"/>
               <a:t>Click to edit Master text styles</a:t>
             </a:r>
           </a:p>
@@ -3786,35 +3776,35 @@
           <a:p>
             <a:pPr lvl="0" eaLnBrk="1" latinLnBrk="0" hangingPunct="1"/>
             <a:r>
-              <a:rPr lang="en-US" smtClean="0"/>
+              <a:rPr lang="en-US"/>
               <a:t>Click to edit Master text styles</a:t>
             </a:r>
           </a:p>
           <a:p>
             <a:pPr lvl="1" eaLnBrk="1" latinLnBrk="0" hangingPunct="1"/>
             <a:r>
-              <a:rPr lang="en-US" smtClean="0"/>
+              <a:rPr lang="en-US"/>
               <a:t>Second level</a:t>
             </a:r>
           </a:p>
           <a:p>
             <a:pPr lvl="2" eaLnBrk="1" latinLnBrk="0" hangingPunct="1"/>
             <a:r>
-              <a:rPr lang="en-US" smtClean="0"/>
+              <a:rPr lang="en-US"/>
               <a:t>Third level</a:t>
             </a:r>
           </a:p>
           <a:p>
             <a:pPr lvl="3" eaLnBrk="1" latinLnBrk="0" hangingPunct="1"/>
             <a:r>
-              <a:rPr lang="en-US" smtClean="0"/>
+              <a:rPr lang="en-US"/>
               <a:t>Fourth level</a:t>
             </a:r>
           </a:p>
           <a:p>
             <a:pPr lvl="4" eaLnBrk="1" latinLnBrk="0" hangingPunct="1"/>
             <a:r>
-              <a:rPr lang="en-US" smtClean="0"/>
+              <a:rPr lang="en-US"/>
               <a:t>Fifth level</a:t>
             </a:r>
             <a:endParaRPr kumimoji="0" lang="en-US"/>
@@ -3874,10 +3864,9 @@
           </a:lstStyle>
           <a:p>
             <a:r>
-              <a:rPr kumimoji="0" lang="en-US" smtClean="0"/>
+              <a:rPr kumimoji="0" lang="en-US"/>
               <a:t>Click to edit Master title style</a:t>
             </a:r>
-            <a:endParaRPr kumimoji="0" lang="en-US"/>
           </a:p>
         </p:txBody>
       </p:sp>
@@ -3921,7 +3910,7 @@
           <a:p>
             <a:pPr lvl="0" eaLnBrk="1" latinLnBrk="0" hangingPunct="1"/>
             <a:r>
-              <a:rPr kumimoji="0" lang="en-US" smtClean="0"/>
+              <a:rPr kumimoji="0" lang="en-US"/>
               <a:t>Click to edit Master text styles</a:t>
             </a:r>
           </a:p>
@@ -4192,7 +4181,7 @@
           </a:lstStyle>
           <a:p>
             <a:r>
-              <a:rPr kumimoji="0" lang="en-US" smtClean="0"/>
+              <a:rPr kumimoji="0" lang="en-US"/>
               <a:t>Click icon to add picture</a:t>
             </a:r>
             <a:endParaRPr kumimoji="0" lang="en-US" dirty="0"/>
@@ -4349,10 +4338,9 @@
           <a:lstStyle/>
           <a:p>
             <a:r>
-              <a:rPr kumimoji="0" lang="en-US" smtClean="0"/>
+              <a:rPr kumimoji="0" lang="en-US"/>
               <a:t>Click to edit Master title style</a:t>
             </a:r>
-            <a:endParaRPr kumimoji="0" lang="en-US"/>
           </a:p>
         </p:txBody>
       </p:sp>
@@ -4383,38 +4371,37 @@
           <a:p>
             <a:pPr lvl="0" eaLnBrk="1" latinLnBrk="0" hangingPunct="1"/>
             <a:r>
-              <a:rPr kumimoji="0" lang="en-US" smtClean="0"/>
+              <a:rPr kumimoji="0" lang="en-US"/>
               <a:t>Click to edit Master text styles</a:t>
             </a:r>
           </a:p>
           <a:p>
             <a:pPr lvl="1" eaLnBrk="1" latinLnBrk="0" hangingPunct="1"/>
             <a:r>
-              <a:rPr kumimoji="0" lang="en-US" smtClean="0"/>
+              <a:rPr kumimoji="0" lang="en-US"/>
               <a:t>Second level</a:t>
             </a:r>
           </a:p>
           <a:p>
             <a:pPr lvl="2" eaLnBrk="1" latinLnBrk="0" hangingPunct="1"/>
             <a:r>
-              <a:rPr kumimoji="0" lang="en-US" smtClean="0"/>
+              <a:rPr kumimoji="0" lang="en-US"/>
               <a:t>Third level</a:t>
             </a:r>
           </a:p>
           <a:p>
             <a:pPr lvl="3" eaLnBrk="1" latinLnBrk="0" hangingPunct="1"/>
             <a:r>
-              <a:rPr kumimoji="0" lang="en-US" smtClean="0"/>
+              <a:rPr kumimoji="0" lang="en-US"/>
               <a:t>Fourth level</a:t>
             </a:r>
           </a:p>
           <a:p>
             <a:pPr lvl="4" eaLnBrk="1" latinLnBrk="0" hangingPunct="1"/>
             <a:r>
-              <a:rPr kumimoji="0" lang="en-US" smtClean="0"/>
+              <a:rPr kumimoji="0" lang="en-US"/>
               <a:t>Fifth level</a:t>
             </a:r>
-            <a:endParaRPr kumimoji="0" lang="en-US"/>
           </a:p>
         </p:txBody>
       </p:sp>
@@ -4887,13 +4874,13 @@
           <a:p>
             <a:pPr eaLnBrk="1" hangingPunct="1"/>
             <a:r>
-              <a:rPr lang="en-US" sz="4800" dirty="0" smtClean="0"/>
+              <a:rPr lang="en-US" sz="4800" dirty="0"/>
               <a:t> Time Series Fundamentals</a:t>
             </a:r>
             <a:br>
-              <a:rPr lang="en-US" sz="4800" dirty="0" smtClean="0"/>
+              <a:rPr lang="en-US" sz="4800" dirty="0"/>
             </a:br>
-            <a:endParaRPr lang="en-US" sz="2700" dirty="0" smtClean="0"/>
+            <a:endParaRPr lang="en-US" sz="2700" dirty="0"/>
           </a:p>
         </p:txBody>
       </p:sp>
@@ -4920,16 +4907,15 @@
           <a:lstStyle/>
           <a:p>
             <a:r>
-              <a:rPr lang="en-US" sz="4000" dirty="0" smtClean="0"/>
+              <a:rPr lang="en-US" sz="4000" dirty="0"/>
               <a:t>ACFs, PACFs and ARIMA Models</a:t>
             </a:r>
           </a:p>
           <a:p>
             <a:r>
-              <a:rPr lang="en-US" sz="4000" dirty="0" smtClean="0"/>
+              <a:rPr lang="en-US" sz="4000" dirty="0"/>
               <a:t>Part 1</a:t>
             </a:r>
-            <a:endParaRPr lang="en-US" sz="4000" dirty="0"/>
           </a:p>
         </p:txBody>
       </p:sp>
@@ -4938,13 +4924,6 @@
   <p:clrMapOvr>
     <a:masterClrMapping/>
   </p:clrMapOvr>
-  <p:timing>
-    <p:tnLst>
-      <p:par>
-        <p:cTn id="1" dur="indefinite" restart="never" nodeType="tmRoot"/>
-      </p:par>
-    </p:tnLst>
-  </p:timing>
 </p:sld>
 </file>
 
@@ -5112,7 +5091,7 @@
               <a:buAutoNum type="arabicPeriod"/>
             </a:pPr>
             <a:r>
-              <a:rPr lang="en-US" sz="2000" dirty="0" smtClean="0"/>
+              <a:rPr lang="en-US" sz="2000" dirty="0"/>
               <a:t>Sadly, the IDRE chart fails us here.  They don’t list time series in the chart.  But we can do it here ourselves.</a:t>
             </a:r>
           </a:p>
@@ -5123,7 +5102,7 @@
               </a:spcBef>
               <a:buAutoNum type="arabicPeriod"/>
             </a:pPr>
-            <a:endParaRPr lang="en-US" dirty="0" smtClean="0"/>
+            <a:endParaRPr lang="en-US" dirty="0"/>
           </a:p>
           <a:p>
             <a:pPr marL="514350" indent="-514350">
@@ -5246,10 +5225,9 @@
           <a:lstStyle/>
           <a:p>
             <a:r>
-              <a:rPr lang="en-US" sz="1000" dirty="0" smtClean="0"/>
+              <a:rPr lang="en-US" sz="1000" dirty="0"/>
               <a:t>Typically Interval</a:t>
             </a:r>
-            <a:endParaRPr lang="en-US" sz="1000" dirty="0"/>
           </a:p>
         </p:txBody>
       </p:sp>
@@ -5278,10 +5256,9 @@
           <a:lstStyle/>
           <a:p>
             <a:r>
-              <a:rPr lang="en-US" sz="1000" dirty="0" smtClean="0"/>
+              <a:rPr lang="en-US" sz="1000" dirty="0"/>
               <a:t>ARIMA models</a:t>
             </a:r>
-            <a:endParaRPr lang="en-US" sz="1000" dirty="0"/>
           </a:p>
         </p:txBody>
       </p:sp>
@@ -5310,10 +5287,9 @@
           <a:lstStyle/>
           <a:p>
             <a:r>
-              <a:rPr lang="en-US" sz="1000" dirty="0" smtClean="0"/>
+              <a:rPr lang="en-US" sz="1000" dirty="0"/>
               <a:t>1</a:t>
             </a:r>
-            <a:endParaRPr lang="en-US" sz="1000" dirty="0"/>
           </a:p>
         </p:txBody>
       </p:sp>
@@ -5342,10 +5318,9 @@
           <a:lstStyle/>
           <a:p>
             <a:r>
-              <a:rPr lang="en-US" sz="1000" dirty="0" smtClean="0"/>
+              <a:rPr lang="en-US" sz="1000" dirty="0"/>
               <a:t>0 or more </a:t>
             </a:r>
-            <a:endParaRPr lang="en-US" sz="1000" dirty="0"/>
           </a:p>
         </p:txBody>
       </p:sp>
@@ -5359,13 +5334,6 @@
   <p:clrMapOvr>
     <a:masterClrMapping/>
   </p:clrMapOvr>
-  <p:timing>
-    <p:tnLst>
-      <p:par>
-        <p:cTn id="1" dur="indefinite" restart="never" nodeType="tmRoot"/>
-      </p:par>
-    </p:tnLst>
-  </p:timing>
 </p:sld>
 </file>
 
@@ -5438,7 +5406,7 @@
               <a:defRPr/>
             </a:pPr>
             <a:r>
-              <a:rPr lang="en-US" sz="3200" dirty="0" smtClean="0">
+              <a:rPr lang="en-US" sz="3200" dirty="0">
                 <a:solidFill>
                   <a:schemeClr val="tx2"/>
                 </a:solidFill>
@@ -5446,7 +5414,7 @@
               <a:t>ARIMA </a:t>
             </a:r>
             <a:r>
-              <a:rPr lang="en-US" sz="3200" dirty="0" err="1" smtClean="0">
+              <a:rPr lang="en-US" sz="3200" dirty="0" err="1">
                 <a:solidFill>
                   <a:schemeClr val="tx2"/>
                 </a:solidFill>
@@ -5530,15 +5498,15 @@
               <a:buAutoNum type="arabicPeriod"/>
             </a:pPr>
             <a:r>
-              <a:rPr lang="en-US" sz="2400" dirty="0" smtClean="0"/>
+              <a:rPr lang="en-US" sz="2400" dirty="0"/>
               <a:t>There are three parameters for ARIMA models – autoregressive (p), differencing (d) and moving average (q) or ARIMA(</a:t>
             </a:r>
             <a:r>
-              <a:rPr lang="en-US" sz="2400" dirty="0" err="1" smtClean="0"/>
+              <a:rPr lang="en-US" sz="2400" dirty="0" err="1"/>
               <a:t>p,d,q</a:t>
             </a:r>
             <a:r>
-              <a:rPr lang="en-US" sz="2400" dirty="0" smtClean="0"/>
+              <a:rPr lang="en-US" sz="2400" dirty="0"/>
               <a:t>).</a:t>
             </a:r>
           </a:p>
@@ -5558,7 +5526,7 @@
               </a:spcBef>
               <a:buAutoNum type="arabicPeriod"/>
             </a:pPr>
-            <a:endParaRPr lang="en-US" sz="2400" dirty="0" smtClean="0"/>
+            <a:endParaRPr lang="en-US" sz="2400" dirty="0"/>
           </a:p>
           <a:p>
             <a:pPr marL="514350" indent="-514350">
@@ -5568,7 +5536,7 @@
               <a:buAutoNum type="arabicPeriod"/>
             </a:pPr>
             <a:r>
-              <a:rPr lang="en-US" sz="2400" dirty="0" smtClean="0"/>
+              <a:rPr lang="en-US" sz="2400" dirty="0"/>
               <a:t>Here is an example of an ARIMA model specification where there is a first order autoregressive process, a first order differencing and a first order moving average</a:t>
             </a:r>
           </a:p>
@@ -5579,7 +5547,7 @@
               </a:spcBef>
               <a:buNone/>
             </a:pPr>
-            <a:endParaRPr lang="en-US" sz="2200" dirty="0" smtClean="0"/>
+            <a:endParaRPr lang="en-US" sz="2200" dirty="0"/>
           </a:p>
           <a:p>
             <a:pPr marL="274320" lvl="1" indent="0">
@@ -5598,11 +5566,11 @@
               <a:buNone/>
             </a:pPr>
             <a:r>
-              <a:rPr lang="en-US" sz="2200" dirty="0" smtClean="0"/>
+              <a:rPr lang="en-US" sz="2200" dirty="0"/>
               <a:t>                                      </a:t>
             </a:r>
             <a:r>
-              <a:rPr lang="en-US" sz="3600" dirty="0" smtClean="0"/>
+              <a:rPr lang="en-US" sz="3600" dirty="0"/>
               <a:t>ARIMA (1,1,1)</a:t>
             </a:r>
             <a:endParaRPr lang="en-US" dirty="0"/>
@@ -5637,13 +5605,6 @@
   <p:clrMapOvr>
     <a:masterClrMapping/>
   </p:clrMapOvr>
-  <p:timing>
-    <p:tnLst>
-      <p:par>
-        <p:cTn id="1" dur="indefinite" restart="never" nodeType="tmRoot"/>
-      </p:par>
-    </p:tnLst>
-  </p:timing>
 </p:sld>
 </file>
 
@@ -5716,18 +5677,13 @@
               <a:defRPr/>
             </a:pPr>
             <a:r>
-              <a:rPr lang="en-US" sz="3200" dirty="0" smtClean="0">
+              <a:rPr lang="en-US" sz="3200" dirty="0">
                 <a:solidFill>
                   <a:schemeClr val="tx2"/>
                 </a:solidFill>
               </a:rPr>
               <a:t>ARIMA Parameters</a:t>
             </a:r>
-            <a:endParaRPr lang="en-US" sz="3200" dirty="0">
-              <a:solidFill>
-                <a:schemeClr val="tx2"/>
-              </a:solidFill>
-            </a:endParaRPr>
           </a:p>
         </p:txBody>
       </p:sp>
@@ -5800,7 +5756,7 @@
               <a:buAutoNum type="arabicPeriod"/>
             </a:pPr>
             <a:r>
-              <a:rPr lang="en-US" sz="2400" dirty="0" smtClean="0"/>
+              <a:rPr lang="en-US" sz="2400" dirty="0"/>
               <a:t>Remember that moving averages can be first order, second order, etc.  If you think the moving average process goes back two time periods then the ARIMA model might look like this:</a:t>
             </a:r>
           </a:p>
@@ -5821,11 +5777,11 @@
               <a:buNone/>
             </a:pPr>
             <a:r>
-              <a:rPr lang="en-US" sz="2200" dirty="0" smtClean="0"/>
+              <a:rPr lang="en-US" sz="2200" dirty="0"/>
               <a:t>                                      </a:t>
             </a:r>
             <a:r>
-              <a:rPr lang="en-US" sz="3600" dirty="0" smtClean="0"/>
+              <a:rPr lang="en-US" sz="3600" dirty="0"/>
               <a:t>ARIMA (1,1,2)</a:t>
             </a:r>
             <a:endParaRPr lang="en-US" dirty="0"/>
@@ -5860,13 +5816,6 @@
   <p:clrMapOvr>
     <a:masterClrMapping/>
   </p:clrMapOvr>
-  <p:timing>
-    <p:tnLst>
-      <p:par>
-        <p:cTn id="1" dur="indefinite" restart="never" nodeType="tmRoot"/>
-      </p:par>
-    </p:tnLst>
-  </p:timing>
 </p:sld>
 </file>
 
@@ -5939,18 +5888,13 @@
               <a:defRPr/>
             </a:pPr>
             <a:r>
-              <a:rPr lang="en-US" sz="3200" dirty="0" smtClean="0">
+              <a:rPr lang="en-US" sz="3200" dirty="0">
                 <a:solidFill>
                   <a:schemeClr val="tx2"/>
                 </a:solidFill>
               </a:rPr>
               <a:t>ARIMA Parameters</a:t>
             </a:r>
-            <a:endParaRPr lang="en-US" sz="3200" dirty="0">
-              <a:solidFill>
-                <a:schemeClr val="tx2"/>
-              </a:solidFill>
-            </a:endParaRPr>
           </a:p>
         </p:txBody>
       </p:sp>
@@ -6023,7 +5967,7 @@
               <a:buAutoNum type="arabicPeriod"/>
             </a:pPr>
             <a:r>
-              <a:rPr lang="en-US" sz="2400" dirty="0" smtClean="0"/>
+              <a:rPr lang="en-US" sz="2400" dirty="0"/>
               <a:t>If you think the autoregressive process goes back 2 time periods then the ARIMA model would look like this and there would be two autoregressive terms in the model – one for the time period t-1 and one for time period t-2.</a:t>
             </a:r>
           </a:p>
@@ -6044,11 +5988,11 @@
               <a:buNone/>
             </a:pPr>
             <a:r>
-              <a:rPr lang="en-US" sz="2200" dirty="0" smtClean="0"/>
+              <a:rPr lang="en-US" sz="2200" dirty="0"/>
               <a:t>                                      </a:t>
             </a:r>
             <a:r>
-              <a:rPr lang="en-US" sz="3600" dirty="0" smtClean="0"/>
+              <a:rPr lang="en-US" sz="3600" dirty="0"/>
               <a:t>ARIMA (2,1,1)</a:t>
             </a:r>
             <a:endParaRPr lang="en-US" dirty="0"/>
@@ -6083,13 +6027,6 @@
   <p:clrMapOvr>
     <a:masterClrMapping/>
   </p:clrMapOvr>
-  <p:timing>
-    <p:tnLst>
-      <p:par>
-        <p:cTn id="1" dur="indefinite" restart="never" nodeType="tmRoot"/>
-      </p:par>
-    </p:tnLst>
-  </p:timing>
 </p:sld>
 </file>
 
@@ -6162,18 +6099,13 @@
               <a:defRPr/>
             </a:pPr>
             <a:r>
-              <a:rPr lang="en-US" sz="3200" dirty="0" smtClean="0">
+              <a:rPr lang="en-US" sz="3200" dirty="0">
                 <a:solidFill>
                   <a:schemeClr val="tx2"/>
                 </a:solidFill>
               </a:rPr>
               <a:t>ARIMA Parameters</a:t>
             </a:r>
-            <a:endParaRPr lang="en-US" sz="3200" dirty="0">
-              <a:solidFill>
-                <a:schemeClr val="tx2"/>
-              </a:solidFill>
-            </a:endParaRPr>
           </a:p>
         </p:txBody>
       </p:sp>
@@ -6246,7 +6178,7 @@
               <a:buAutoNum type="arabicPeriod"/>
             </a:pPr>
             <a:r>
-              <a:rPr lang="en-US" sz="2400" dirty="0" smtClean="0"/>
+              <a:rPr lang="en-US" sz="2400" dirty="0"/>
               <a:t>Remember that we need to work with stationary time series in our time series models.  That is, there should be no slope (e.g. constant mean) in our data.  In real life remember that often this is not the case – sales go up over time or the price of a stock goes down over time, etc.</a:t>
             </a:r>
           </a:p>
@@ -6267,7 +6199,7 @@
               <a:buAutoNum type="arabicPeriod"/>
             </a:pPr>
             <a:r>
-              <a:rPr lang="en-US" sz="2400" dirty="0" smtClean="0"/>
+              <a:rPr lang="en-US" sz="2400" dirty="0"/>
               <a:t>The middle parameter in the ARIMA specification is the differencing parameter.  Remember how last time we differenced the data manually to remove the trend?  Well, ARIMA thoughtfully will do that for you if you put a 1 in the middle (d) parameter as seen here below.</a:t>
             </a:r>
           </a:p>
@@ -6288,11 +6220,11 @@
               <a:buNone/>
             </a:pPr>
             <a:r>
-              <a:rPr lang="en-US" sz="2200" dirty="0" smtClean="0"/>
+              <a:rPr lang="en-US" sz="2200" dirty="0"/>
               <a:t>                                      </a:t>
             </a:r>
             <a:r>
-              <a:rPr lang="en-US" sz="3600" dirty="0" smtClean="0"/>
+              <a:rPr lang="en-US" sz="3600" dirty="0"/>
               <a:t>ARIMA (2,1,1)</a:t>
             </a:r>
             <a:endParaRPr lang="en-US" dirty="0"/>
@@ -6327,13 +6259,6 @@
   <p:clrMapOvr>
     <a:masterClrMapping/>
   </p:clrMapOvr>
-  <p:timing>
-    <p:tnLst>
-      <p:par>
-        <p:cTn id="1" dur="indefinite" restart="never" nodeType="tmRoot"/>
-      </p:par>
-    </p:tnLst>
-  </p:timing>
 </p:sld>
 </file>
 
@@ -6406,18 +6331,13 @@
               <a:defRPr/>
             </a:pPr>
             <a:r>
-              <a:rPr lang="en-US" sz="3200" dirty="0" smtClean="0">
+              <a:rPr lang="en-US" sz="3200" dirty="0">
                 <a:solidFill>
                   <a:schemeClr val="tx2"/>
                 </a:solidFill>
               </a:rPr>
               <a:t>ARIMA Parameters</a:t>
             </a:r>
-            <a:endParaRPr lang="en-US" sz="3200" dirty="0">
-              <a:solidFill>
-                <a:schemeClr val="tx2"/>
-              </a:solidFill>
-            </a:endParaRPr>
           </a:p>
         </p:txBody>
       </p:sp>
@@ -6490,7 +6410,7 @@
               <a:buAutoNum type="arabicPeriod"/>
             </a:pPr>
             <a:r>
-              <a:rPr lang="en-US" sz="2400" dirty="0" smtClean="0"/>
+              <a:rPr lang="en-US" sz="2400" dirty="0"/>
               <a:t>Remember that we need to work with stationary time series in our time series models.  That is, there should be no slope (e.g. constant mean) in our data.  In real life remember that often this is not the case – sales go up over time or the price of a stock goes down over time, etc.</a:t>
             </a:r>
           </a:p>
@@ -6511,7 +6431,7 @@
               <a:buAutoNum type="arabicPeriod"/>
             </a:pPr>
             <a:r>
-              <a:rPr lang="en-US" sz="2400" dirty="0" smtClean="0"/>
+              <a:rPr lang="en-US" sz="2400" dirty="0"/>
               <a:t>The middle parameter in the ARIMA specification is the differencing parameter.  Remember how last time we differenced the data manually to remove the trend?  Well, ARIMA thoughtfully will do that for you if you put a 1 in the middle (d) parameter as seen here below.</a:t>
             </a:r>
           </a:p>
@@ -6532,11 +6452,11 @@
               <a:buNone/>
             </a:pPr>
             <a:r>
-              <a:rPr lang="en-US" sz="2200" dirty="0" smtClean="0"/>
+              <a:rPr lang="en-US" sz="2200" dirty="0"/>
               <a:t>                                      </a:t>
             </a:r>
             <a:r>
-              <a:rPr lang="en-US" sz="3600" dirty="0" smtClean="0"/>
+              <a:rPr lang="en-US" sz="3600" dirty="0"/>
               <a:t>ARIMA (2,1,1)</a:t>
             </a:r>
             <a:endParaRPr lang="en-US" dirty="0"/>
@@ -6571,13 +6491,6 @@
   <p:clrMapOvr>
     <a:masterClrMapping/>
   </p:clrMapOvr>
-  <p:timing>
-    <p:tnLst>
-      <p:par>
-        <p:cTn id="1" dur="indefinite" restart="never" nodeType="tmRoot"/>
-      </p:par>
-    </p:tnLst>
-  </p:timing>
 </p:sld>
 </file>
 
@@ -6650,18 +6563,13 @@
               <a:defRPr/>
             </a:pPr>
             <a:r>
-              <a:rPr lang="en-US" sz="3200" dirty="0" smtClean="0">
+              <a:rPr lang="en-US" sz="3200" dirty="0">
                 <a:solidFill>
                   <a:schemeClr val="tx2"/>
                 </a:solidFill>
               </a:rPr>
               <a:t>ARIMA Parameters</a:t>
             </a:r>
-            <a:endParaRPr lang="en-US" sz="3200" dirty="0">
-              <a:solidFill>
-                <a:schemeClr val="tx2"/>
-              </a:solidFill>
-            </a:endParaRPr>
           </a:p>
         </p:txBody>
       </p:sp>
@@ -6734,15 +6642,15 @@
               <a:buAutoNum type="arabicPeriod"/>
             </a:pPr>
             <a:r>
-              <a:rPr lang="en-US" sz="2400" dirty="0" smtClean="0"/>
+              <a:rPr lang="en-US" sz="2400" dirty="0"/>
               <a:t>Don’t need differencing or a moving average process?  For any of the ARIMA(</a:t>
             </a:r>
             <a:r>
-              <a:rPr lang="en-US" sz="2400" dirty="0" err="1" smtClean="0"/>
+              <a:rPr lang="en-US" sz="2400" dirty="0" err="1"/>
               <a:t>p,d,q</a:t>
             </a:r>
             <a:r>
-              <a:rPr lang="en-US" sz="2400" dirty="0" smtClean="0"/>
+              <a:rPr lang="en-US" sz="2400" dirty="0"/>
               <a:t>) you can put zero.</a:t>
             </a:r>
           </a:p>
@@ -6763,7 +6671,7 @@
               <a:buAutoNum type="arabicPeriod"/>
             </a:pPr>
             <a:r>
-              <a:rPr lang="en-US" sz="2400" dirty="0" smtClean="0"/>
+              <a:rPr lang="en-US" sz="2400" dirty="0"/>
               <a:t>Here is an ARIMA model where the data is already stationary (e.g. no trend, etc.) and there is no moving average in the model, just a first order autoregressive term.</a:t>
             </a:r>
           </a:p>
@@ -6784,11 +6692,11 @@
               <a:buNone/>
             </a:pPr>
             <a:r>
-              <a:rPr lang="en-US" sz="2200" dirty="0" smtClean="0"/>
+              <a:rPr lang="en-US" sz="2200" dirty="0"/>
               <a:t>                                      </a:t>
             </a:r>
             <a:r>
-              <a:rPr lang="en-US" sz="3600" dirty="0" smtClean="0"/>
+              <a:rPr lang="en-US" sz="3600" dirty="0"/>
               <a:t>ARIMA (1,0,0)</a:t>
             </a:r>
             <a:endParaRPr lang="en-US" dirty="0"/>
@@ -6823,13 +6731,6 @@
   <p:clrMapOvr>
     <a:masterClrMapping/>
   </p:clrMapOvr>
-  <p:timing>
-    <p:tnLst>
-      <p:par>
-        <p:cTn id="1" dur="indefinite" restart="never" nodeType="tmRoot"/>
-      </p:par>
-    </p:tnLst>
-  </p:timing>
 </p:sld>
 </file>
 
@@ -6902,18 +6803,13 @@
               <a:defRPr/>
             </a:pPr>
             <a:r>
-              <a:rPr lang="en-US" sz="3200" dirty="0" smtClean="0">
+              <a:rPr lang="en-US" sz="3200" dirty="0">
                 <a:solidFill>
                   <a:schemeClr val="tx2"/>
                 </a:solidFill>
               </a:rPr>
               <a:t>ARIMA Parameters, ACF and PACF</a:t>
             </a:r>
-            <a:endParaRPr lang="en-US" sz="3200" dirty="0">
-              <a:solidFill>
-                <a:schemeClr val="tx2"/>
-              </a:solidFill>
-            </a:endParaRPr>
           </a:p>
         </p:txBody>
       </p:sp>
@@ -6986,7 +6882,7 @@
               <a:buAutoNum type="arabicPeriod"/>
             </a:pPr>
             <a:r>
-              <a:rPr lang="en-US" sz="2400" dirty="0" smtClean="0"/>
+              <a:rPr lang="en-US" sz="2400" dirty="0"/>
               <a:t>Automated ARIMA model identification - this one of those “I walked ten miles in the snow to go to school” stories when there is a car to take me there?</a:t>
             </a:r>
           </a:p>
@@ -7007,7 +6903,7 @@
               <a:buAutoNum type="arabicPeriod"/>
             </a:pPr>
             <a:r>
-              <a:rPr lang="en-US" sz="2400" dirty="0" smtClean="0"/>
+              <a:rPr lang="en-US" sz="2400" dirty="0"/>
               <a:t>It really will help you understand the processes at work if you do the work yourself and on occasion the model you come up with may not be what your automated procedure suggests.  </a:t>
             </a:r>
           </a:p>
@@ -7028,15 +6924,15 @@
               <a:buAutoNum type="arabicPeriod"/>
             </a:pPr>
             <a:r>
-              <a:rPr lang="en-US" sz="2400" dirty="0" smtClean="0"/>
+              <a:rPr lang="en-US" sz="2400" dirty="0"/>
               <a:t>So it’s time to return to our old </a:t>
             </a:r>
             <a:r>
-              <a:rPr lang="en-US" sz="2400" dirty="0" err="1" smtClean="0"/>
+              <a:rPr lang="en-US" sz="2400" dirty="0" err="1"/>
               <a:t>playpals</a:t>
             </a:r>
             <a:r>
-              <a:rPr lang="en-US" sz="2400" dirty="0" smtClean="0"/>
+              <a:rPr lang="en-US" sz="2400" dirty="0"/>
               <a:t> – the autocorrelation function (ACF) and the partial autocorrelation function (PACF) to help us decide how to set our ARIMA model parameters.</a:t>
             </a:r>
           </a:p>
@@ -7079,13 +6975,6 @@
   <p:clrMapOvr>
     <a:masterClrMapping/>
   </p:clrMapOvr>
-  <p:timing>
-    <p:tnLst>
-      <p:par>
-        <p:cTn id="1" dur="indefinite" restart="never" nodeType="tmRoot"/>
-      </p:par>
-    </p:tnLst>
-  </p:timing>
 </p:sld>
 </file>
 
@@ -7158,18 +7047,13 @@
               <a:defRPr/>
             </a:pPr>
             <a:r>
-              <a:rPr lang="en-US" sz="3200" dirty="0" smtClean="0">
+              <a:rPr lang="en-US" sz="3200" dirty="0">
                 <a:solidFill>
                   <a:schemeClr val="tx2"/>
                 </a:solidFill>
               </a:rPr>
               <a:t>ARIMA Parameters, ACF and PACF</a:t>
             </a:r>
-            <a:endParaRPr lang="en-US" sz="3200" dirty="0">
-              <a:solidFill>
-                <a:schemeClr val="tx2"/>
-              </a:solidFill>
-            </a:endParaRPr>
           </a:p>
         </p:txBody>
       </p:sp>
@@ -7242,15 +7126,15 @@
               <a:buAutoNum type="arabicPeriod"/>
             </a:pPr>
             <a:r>
-              <a:rPr lang="en-US" sz="2400" dirty="0" smtClean="0"/>
+              <a:rPr lang="en-US" sz="2400" dirty="0"/>
               <a:t>Remember we are interested in specifying our three ARIMA parameters – ARIMA(</a:t>
             </a:r>
             <a:r>
-              <a:rPr lang="en-US" sz="2400" dirty="0" err="1" smtClean="0"/>
+              <a:rPr lang="en-US" sz="2400" dirty="0" err="1"/>
               <a:t>p,d,q</a:t>
             </a:r>
             <a:r>
-              <a:rPr lang="en-US" sz="2400" dirty="0" smtClean="0"/>
+              <a:rPr lang="en-US" sz="2400" dirty="0"/>
               <a:t>).  First let’s look at our advertising spend data…</a:t>
             </a:r>
           </a:p>
@@ -7271,7 +7155,7 @@
               <a:buAutoNum type="arabicPeriod"/>
             </a:pPr>
             <a:r>
-              <a:rPr lang="en-US" sz="2400" dirty="0" smtClean="0"/>
+              <a:rPr lang="en-US" sz="2400" dirty="0"/>
               <a:t>Does it look like there is a trend we need to difference?</a:t>
             </a:r>
           </a:p>
@@ -7378,13 +7262,6 @@
   <p:clrMapOvr>
     <a:masterClrMapping/>
   </p:clrMapOvr>
-  <p:timing>
-    <p:tnLst>
-      <p:par>
-        <p:cTn id="1" dur="indefinite" restart="never" nodeType="tmRoot"/>
-      </p:par>
-    </p:tnLst>
-  </p:timing>
 </p:sld>
 </file>
 
@@ -7457,18 +7334,13 @@
               <a:defRPr/>
             </a:pPr>
             <a:r>
-              <a:rPr lang="en-US" sz="3200" dirty="0" smtClean="0">
+              <a:rPr lang="en-US" sz="3200" dirty="0">
                 <a:solidFill>
                   <a:schemeClr val="tx2"/>
                 </a:solidFill>
               </a:rPr>
               <a:t>ARIMA Parameters, ACF and PACF</a:t>
             </a:r>
-            <a:endParaRPr lang="en-US" sz="3200" dirty="0">
-              <a:solidFill>
-                <a:schemeClr val="tx2"/>
-              </a:solidFill>
-            </a:endParaRPr>
           </a:p>
         </p:txBody>
       </p:sp>
@@ -7541,10 +7413,9 @@
               <a:buAutoNum type="arabicPeriod"/>
             </a:pPr>
             <a:r>
-              <a:rPr lang="en-US" dirty="0" smtClean="0"/>
+              <a:rPr lang="en-US" dirty="0"/>
               <a:t>Now let’s try another tool to see if the mean is stationary – ACF plot.  Here is what a typical ACF plot looks like for a non-constant mean or trend in the data.</a:t>
             </a:r>
-            <a:endParaRPr lang="en-US" dirty="0"/>
           </a:p>
           <a:p>
             <a:pPr marL="0" indent="0">
@@ -7604,10 +7475,9 @@
           <a:lstStyle/>
           <a:p>
             <a:r>
-              <a:rPr lang="en-US" dirty="0" smtClean="0"/>
+              <a:rPr lang="en-US" dirty="0"/>
               <a:t>Typical ACF for trend in data</a:t>
             </a:r>
-            <a:endParaRPr lang="en-US" dirty="0"/>
           </a:p>
         </p:txBody>
       </p:sp>
@@ -7621,13 +7491,6 @@
   <p:clrMapOvr>
     <a:masterClrMapping/>
   </p:clrMapOvr>
-  <p:timing>
-    <p:tnLst>
-      <p:par>
-        <p:cTn id="1" dur="indefinite" restart="never" nodeType="tmRoot"/>
-      </p:par>
-    </p:tnLst>
-  </p:timing>
 </p:sld>
 </file>
 
@@ -7695,7 +7558,7 @@
               <a:defRPr/>
             </a:pPr>
             <a:r>
-              <a:rPr kumimoji="0" lang="en-US" sz="3200" b="0" i="0" u="none" strike="noStrike" kern="1200" cap="none" spc="0" normalizeH="0" baseline="0" noProof="0" dirty="0" smtClean="0">
+              <a:rPr kumimoji="0" lang="en-US" sz="3200" b="0" i="0" u="none" strike="noStrike" kern="1200" cap="none" spc="0" normalizeH="0" baseline="0" noProof="0" dirty="0">
                 <a:ln>
                   <a:noFill/>
                 </a:ln>
@@ -7711,20 +7574,6 @@
               </a:rPr>
               <a:t>Step 1:  Nature of Time Series</a:t>
             </a:r>
-            <a:endParaRPr kumimoji="0" lang="en-US" sz="3200" b="0" i="0" u="none" strike="noStrike" kern="1200" cap="none" spc="0" normalizeH="0" baseline="0" noProof="0" dirty="0">
-              <a:ln>
-                <a:noFill/>
-              </a:ln>
-              <a:solidFill>
-                <a:schemeClr val="tx2"/>
-              </a:solidFill>
-              <a:effectLst/>
-              <a:uLnTx/>
-              <a:uFillTx/>
-              <a:latin typeface="+mj-lt"/>
-              <a:ea typeface="+mj-ea"/>
-              <a:cs typeface="+mj-cs"/>
-            </a:endParaRPr>
           </a:p>
         </p:txBody>
       </p:sp>
@@ -7797,7 +7646,7 @@
               <a:buAutoNum type="arabicPeriod"/>
             </a:pPr>
             <a:r>
-              <a:rPr lang="en-US" dirty="0" smtClean="0"/>
+              <a:rPr lang="en-US" dirty="0"/>
               <a:t>We’ve been introduced to moving averages (MA), autoregressive processes (AR) and the idea of stationary series.  Now we are going to put them all together in a single time series model – ARIMA models.</a:t>
             </a:r>
           </a:p>
@@ -7818,7 +7667,7 @@
               <a:buAutoNum type="arabicPeriod"/>
             </a:pPr>
             <a:r>
-              <a:rPr lang="en-US" dirty="0" smtClean="0"/>
+              <a:rPr lang="en-US" dirty="0"/>
               <a:t>In order to do that, we will need to explore the world of ACF and PACF functions a little more as well.  We were introduced to these handy things in the last lecture, but time to learn to interpret them a bit more closely.</a:t>
             </a:r>
           </a:p>
@@ -7829,7 +7678,7 @@
               </a:spcBef>
               <a:buNone/>
             </a:pPr>
-            <a:endParaRPr lang="en-US" dirty="0" smtClean="0"/>
+            <a:endParaRPr lang="en-US" dirty="0"/>
           </a:p>
         </p:txBody>
       </p:sp>
@@ -8035,7 +7884,7 @@
               <a:buFont typeface="Wingdings 2"/>
               <a:buAutoNum type="arabicPeriod"/>
             </a:pPr>
-            <a:endParaRPr lang="en-US" b="1" dirty="0" smtClean="0"/>
+            <a:endParaRPr lang="en-US" b="1" dirty="0"/>
           </a:p>
         </p:txBody>
       </p:sp>
@@ -8049,13 +7898,6 @@
   <p:clrMapOvr>
     <a:masterClrMapping/>
   </p:clrMapOvr>
-  <p:timing>
-    <p:tnLst>
-      <p:par>
-        <p:cTn id="1" dur="indefinite" restart="never" nodeType="tmRoot"/>
-      </p:par>
-    </p:tnLst>
-  </p:timing>
 </p:sld>
 </file>
 
@@ -8128,18 +7970,13 @@
               <a:defRPr/>
             </a:pPr>
             <a:r>
-              <a:rPr lang="en-US" sz="3200" dirty="0" smtClean="0">
+              <a:rPr lang="en-US" sz="3200" dirty="0">
                 <a:solidFill>
                   <a:schemeClr val="tx2"/>
                 </a:solidFill>
               </a:rPr>
               <a:t>ARIMA Parameters, ACF and PACF</a:t>
             </a:r>
-            <a:endParaRPr lang="en-US" sz="3200" dirty="0">
-              <a:solidFill>
-                <a:schemeClr val="tx2"/>
-              </a:solidFill>
-            </a:endParaRPr>
           </a:p>
         </p:txBody>
       </p:sp>
@@ -8212,7 +8049,7 @@
               <a:buAutoNum type="arabicPeriod"/>
             </a:pPr>
             <a:r>
-              <a:rPr lang="en-US" sz="2400" dirty="0" smtClean="0"/>
+              <a:rPr lang="en-US" sz="2400" dirty="0"/>
               <a:t>What does our ACF look like for our ad spend data?  It does seem to match our ski slope pattern and suggests non-constant mean.</a:t>
             </a:r>
           </a:p>
@@ -8297,13 +8134,6 @@
   <p:clrMapOvr>
     <a:masterClrMapping/>
   </p:clrMapOvr>
-  <p:timing>
-    <p:tnLst>
-      <p:par>
-        <p:cTn id="1" dur="indefinite" restart="never" nodeType="tmRoot"/>
-      </p:par>
-    </p:tnLst>
-  </p:timing>
 </p:sld>
 </file>
 
@@ -8376,18 +8206,13 @@
               <a:defRPr/>
             </a:pPr>
             <a:r>
-              <a:rPr lang="en-US" sz="3200" dirty="0" smtClean="0">
+              <a:rPr lang="en-US" sz="3200" dirty="0">
                 <a:solidFill>
                   <a:schemeClr val="tx2"/>
                 </a:solidFill>
               </a:rPr>
               <a:t>ARIMA Parameters, ACF and PACF</a:t>
             </a:r>
-            <a:endParaRPr lang="en-US" sz="3200" dirty="0">
-              <a:solidFill>
-                <a:schemeClr val="tx2"/>
-              </a:solidFill>
-            </a:endParaRPr>
           </a:p>
         </p:txBody>
       </p:sp>
@@ -8460,7 +8285,7 @@
               <a:buAutoNum type="arabicPeriod"/>
             </a:pPr>
             <a:r>
-              <a:rPr lang="en-US" sz="2400" dirty="0" smtClean="0"/>
+              <a:rPr lang="en-US" sz="2400" dirty="0"/>
               <a:t>So we’ve tried the mark I eyeball test and then secondly looked at the ACF graph – are there any actual tests I can use to see if there is a non-constant mean?     Yes there are!</a:t>
             </a:r>
           </a:p>
@@ -8481,15 +8306,15 @@
               <a:buAutoNum type="arabicPeriod"/>
             </a:pPr>
             <a:r>
-              <a:rPr lang="en-US" sz="2400" dirty="0" smtClean="0"/>
+              <a:rPr lang="en-US" sz="2400" dirty="0"/>
               <a:t>In GRETL there are the </a:t>
             </a:r>
             <a:r>
-              <a:rPr lang="en-US" sz="2400" dirty="0" err="1" smtClean="0"/>
+              <a:rPr lang="en-US" sz="2400" dirty="0" err="1"/>
               <a:t>Augemented</a:t>
             </a:r>
             <a:r>
-              <a:rPr lang="en-US" sz="2400" dirty="0" smtClean="0"/>
+              <a:rPr lang="en-US" sz="2400" dirty="0"/>
               <a:t> Dickey Fuller test and the KPSS test.  </a:t>
             </a:r>
           </a:p>
@@ -8550,13 +8375,6 @@
   <p:clrMapOvr>
     <a:masterClrMapping/>
   </p:clrMapOvr>
-  <p:timing>
-    <p:tnLst>
-      <p:par>
-        <p:cTn id="1" dur="indefinite" restart="never" nodeType="tmRoot"/>
-      </p:par>
-    </p:tnLst>
-  </p:timing>
 </p:sld>
 </file>
 
@@ -8629,18 +8447,13 @@
               <a:defRPr/>
             </a:pPr>
             <a:r>
-              <a:rPr lang="en-US" sz="3200" dirty="0" smtClean="0">
+              <a:rPr lang="en-US" sz="3200" dirty="0">
                 <a:solidFill>
                   <a:schemeClr val="tx2"/>
                 </a:solidFill>
               </a:rPr>
               <a:t>ARIMA Parameters, ACF and PACF</a:t>
             </a:r>
-            <a:endParaRPr lang="en-US" sz="3200" dirty="0">
-              <a:solidFill>
-                <a:schemeClr val="tx2"/>
-              </a:solidFill>
-            </a:endParaRPr>
           </a:p>
         </p:txBody>
       </p:sp>
@@ -8713,7 +8526,7 @@
               <a:buAutoNum type="arabicPeriod"/>
             </a:pPr>
             <a:r>
-              <a:rPr lang="en-US" sz="2400" dirty="0" smtClean="0"/>
+              <a:rPr lang="en-US" sz="2400" dirty="0"/>
               <a:t>Let’s look at the KPSS test first because it is more straightforward.</a:t>
             </a:r>
           </a:p>
@@ -8734,7 +8547,7 @@
               <a:buAutoNum type="arabicPeriod"/>
             </a:pPr>
             <a:r>
-              <a:rPr lang="en-US" sz="2400" dirty="0" smtClean="0"/>
+              <a:rPr lang="en-US" sz="2400" dirty="0"/>
               <a:t>The  null and alternative hypotheses for KPSS are</a:t>
             </a:r>
           </a:p>
@@ -8745,7 +8558,7 @@
               </a:spcBef>
               <a:buNone/>
             </a:pPr>
-            <a:endParaRPr lang="en-US" sz="2400" dirty="0" smtClean="0"/>
+            <a:endParaRPr lang="en-US" sz="2400" dirty="0"/>
           </a:p>
           <a:p>
             <a:pPr marL="0" indent="0">
@@ -8755,11 +8568,11 @@
               <a:buNone/>
             </a:pPr>
             <a:r>
-              <a:rPr lang="en-US" sz="2400" dirty="0" err="1" smtClean="0"/>
+              <a:rPr lang="en-US" sz="2400" dirty="0" err="1"/>
               <a:t>Hnull</a:t>
             </a:r>
             <a:r>
-              <a:rPr lang="en-US" sz="2400" dirty="0" smtClean="0"/>
+              <a:rPr lang="en-US" sz="2400" dirty="0"/>
               <a:t>:  constant mean</a:t>
             </a:r>
           </a:p>
@@ -8780,7 +8593,7 @@
               <a:buNone/>
             </a:pPr>
             <a:r>
-              <a:rPr lang="en-US" sz="2400" dirty="0" smtClean="0"/>
+              <a:rPr lang="en-US" sz="2400" dirty="0"/>
               <a:t>Halt:  non-constant mean</a:t>
             </a:r>
           </a:p>
@@ -8801,7 +8614,7 @@
               <a:buNone/>
             </a:pPr>
             <a:r>
-              <a:rPr lang="en-US" sz="2400" dirty="0" smtClean="0"/>
+              <a:rPr lang="en-US" sz="2400" dirty="0"/>
               <a:t>What does our KPSS test show?</a:t>
             </a:r>
           </a:p>
@@ -8822,10 +8635,9 @@
               <a:buNone/>
             </a:pPr>
             <a:r>
-              <a:rPr lang="en-US" sz="2400" dirty="0" smtClean="0"/>
+              <a:rPr lang="en-US" sz="2400" dirty="0"/>
               <a:t>No evidence of non-constant mean or trend</a:t>
             </a:r>
-            <a:endParaRPr lang="en-US" sz="2400" dirty="0" smtClean="0"/>
           </a:p>
           <a:p>
             <a:pPr marL="514350" indent="-514350">
@@ -8917,13 +8729,6 @@
   <p:clrMapOvr>
     <a:masterClrMapping/>
   </p:clrMapOvr>
-  <p:timing>
-    <p:tnLst>
-      <p:par>
-        <p:cTn id="1" dur="indefinite" restart="never" nodeType="tmRoot"/>
-      </p:par>
-    </p:tnLst>
-  </p:timing>
 </p:sld>
 </file>
 
@@ -8996,18 +8801,13 @@
               <a:defRPr/>
             </a:pPr>
             <a:r>
-              <a:rPr lang="en-US" sz="3200" dirty="0" smtClean="0">
+              <a:rPr lang="en-US" sz="3200" dirty="0">
                 <a:solidFill>
                   <a:schemeClr val="tx2"/>
                 </a:solidFill>
               </a:rPr>
               <a:t>ARIMA Parameters, ACF and PACF</a:t>
             </a:r>
-            <a:endParaRPr lang="en-US" sz="3200" dirty="0">
-              <a:solidFill>
-                <a:schemeClr val="tx2"/>
-              </a:solidFill>
-            </a:endParaRPr>
           </a:p>
         </p:txBody>
       </p:sp>
@@ -9080,7 +8880,7 @@
               <a:buAutoNum type="arabicPeriod"/>
             </a:pPr>
             <a:r>
-              <a:rPr lang="en-US" sz="2400" dirty="0" smtClean="0"/>
+              <a:rPr lang="en-US" sz="2400" dirty="0"/>
               <a:t>Let’s look at the Augmented Dickey Fuller (ADF) test next.</a:t>
             </a:r>
           </a:p>
@@ -9101,7 +8901,7 @@
               <a:buAutoNum type="arabicPeriod"/>
             </a:pPr>
             <a:r>
-              <a:rPr lang="en-US" sz="2400" dirty="0" smtClean="0"/>
+              <a:rPr lang="en-US" sz="2400" dirty="0"/>
               <a:t>The  null and alternative hypotheses for ADF test are</a:t>
             </a:r>
           </a:p>
@@ -9112,7 +8912,7 @@
               </a:spcBef>
               <a:buNone/>
             </a:pPr>
-            <a:endParaRPr lang="en-US" sz="2400" dirty="0" smtClean="0"/>
+            <a:endParaRPr lang="en-US" sz="2400" dirty="0"/>
           </a:p>
           <a:p>
             <a:pPr marL="0" indent="0">
@@ -9122,11 +8922,11 @@
               <a:buNone/>
             </a:pPr>
             <a:r>
-              <a:rPr lang="en-US" sz="2400" dirty="0" err="1" smtClean="0"/>
+              <a:rPr lang="en-US" sz="2400" dirty="0" err="1"/>
               <a:t>Hnull</a:t>
             </a:r>
             <a:r>
-              <a:rPr lang="en-US" sz="2400" dirty="0" smtClean="0"/>
+              <a:rPr lang="en-US" sz="2400" dirty="0"/>
               <a:t>:  non-constant mean</a:t>
             </a:r>
           </a:p>
@@ -9147,12 +8947,8 @@
               <a:buNone/>
             </a:pPr>
             <a:r>
-              <a:rPr lang="en-US" sz="2400" dirty="0" smtClean="0"/>
-              <a:t>Halt:  constant </a:t>
-            </a:r>
-            <a:r>
-              <a:rPr lang="en-US" sz="2400" dirty="0" smtClean="0"/>
-              <a:t>mean</a:t>
+              <a:rPr lang="en-US" sz="2400" dirty="0"/>
+              <a:t>Halt:  constant mean</a:t>
             </a:r>
           </a:p>
           <a:p>
@@ -9183,7 +8979,7 @@
               </a:spcBef>
               <a:buNone/>
             </a:pPr>
-            <a:endParaRPr lang="en-US" sz="2400" dirty="0" smtClean="0"/>
+            <a:endParaRPr lang="en-US" sz="2400" dirty="0"/>
           </a:p>
           <a:p>
             <a:pPr marL="0" indent="0">
@@ -9193,7 +8989,7 @@
               <a:buNone/>
             </a:pPr>
             <a:r>
-              <a:rPr lang="en-US" sz="2400" dirty="0" smtClean="0"/>
+              <a:rPr lang="en-US" sz="2400" dirty="0"/>
               <a:t>Oh no!!! Just the opposite of KPSS!  Kill me now!</a:t>
             </a:r>
           </a:p>
@@ -9296,13 +9092,6 @@
   <p:clrMapOvr>
     <a:masterClrMapping/>
   </p:clrMapOvr>
-  <p:timing>
-    <p:tnLst>
-      <p:par>
-        <p:cTn id="1" dur="indefinite" restart="never" nodeType="tmRoot"/>
-      </p:par>
-    </p:tnLst>
-  </p:timing>
 </p:sld>
 </file>
 
@@ -9375,18 +9164,13 @@
               <a:defRPr/>
             </a:pPr>
             <a:r>
-              <a:rPr lang="en-US" sz="3200" dirty="0" smtClean="0">
+              <a:rPr lang="en-US" sz="3200" dirty="0">
                 <a:solidFill>
                   <a:schemeClr val="tx2"/>
                 </a:solidFill>
               </a:rPr>
               <a:t>ARIMA Parameters, ACF and PACF</a:t>
             </a:r>
-            <a:endParaRPr lang="en-US" sz="3200" dirty="0">
-              <a:solidFill>
-                <a:schemeClr val="tx2"/>
-              </a:solidFill>
-            </a:endParaRPr>
           </a:p>
         </p:txBody>
       </p:sp>
@@ -9459,7 +9243,7 @@
               <a:buAutoNum type="arabicPeriod"/>
             </a:pPr>
             <a:r>
-              <a:rPr lang="en-US" sz="2400" dirty="0" smtClean="0"/>
+              <a:rPr lang="en-US" sz="2400" dirty="0"/>
               <a:t>So what do we do now?  In summary:</a:t>
             </a:r>
           </a:p>
@@ -9471,7 +9255,7 @@
               <a:buAutoNum type="arabicPeriod"/>
             </a:pPr>
             <a:r>
-              <a:rPr lang="en-US" sz="2200" dirty="0" smtClean="0"/>
+              <a:rPr lang="en-US" sz="2200" dirty="0"/>
               <a:t>The following suggest non-constant mean or trend</a:t>
             </a:r>
           </a:p>
@@ -9483,7 +9267,7 @@
               <a:buAutoNum type="arabicPeriod"/>
             </a:pPr>
             <a:r>
-              <a:rPr lang="en-US" sz="1800" dirty="0" smtClean="0"/>
+              <a:rPr lang="en-US" sz="1800" dirty="0"/>
               <a:t>Eyeball test with trend line</a:t>
             </a:r>
           </a:p>
@@ -9495,7 +9279,7 @@
               <a:buAutoNum type="arabicPeriod"/>
             </a:pPr>
             <a:r>
-              <a:rPr lang="en-US" sz="1800" dirty="0" smtClean="0"/>
+              <a:rPr lang="en-US" sz="1800" dirty="0"/>
               <a:t>ACF plot</a:t>
             </a:r>
           </a:p>
@@ -9507,11 +9291,11 @@
               <a:buAutoNum type="arabicPeriod"/>
             </a:pPr>
             <a:r>
-              <a:rPr lang="en-US" sz="1800" dirty="0" err="1" smtClean="0"/>
+              <a:rPr lang="en-US" sz="1800" dirty="0" err="1"/>
               <a:t>Augemented</a:t>
             </a:r>
             <a:r>
-              <a:rPr lang="en-US" sz="1800" dirty="0" smtClean="0"/>
+              <a:rPr lang="en-US" sz="1800" dirty="0"/>
               <a:t> Dickey Fuller test</a:t>
             </a:r>
           </a:p>
@@ -9532,10 +9316,9 @@
               <a:buNone/>
             </a:pPr>
             <a:r>
-              <a:rPr lang="en-US" sz="2400" dirty="0" smtClean="0"/>
+              <a:rPr lang="en-US" sz="2400" dirty="0"/>
               <a:t>Only the KPSS test suggests no evidence of non-constant mean or trend.</a:t>
             </a:r>
-            <a:endParaRPr lang="en-US" sz="2400" dirty="0" smtClean="0"/>
           </a:p>
           <a:p>
             <a:pPr marL="514350" indent="-514350">
@@ -9554,10 +9337,9 @@
               <a:buNone/>
             </a:pPr>
             <a:r>
-              <a:rPr lang="en-US" sz="2400" dirty="0" smtClean="0"/>
+              <a:rPr lang="en-US" sz="2400" dirty="0"/>
               <a:t>The solution is to be conservative and if two or more of the indicator suggest non-constant mean then declare that and now to fix this</a:t>
             </a:r>
-            <a:endParaRPr lang="en-US" sz="2400" dirty="0" smtClean="0"/>
           </a:p>
           <a:p>
             <a:pPr marL="0" indent="0">
@@ -9658,13 +9440,6 @@
   <p:clrMapOvr>
     <a:masterClrMapping/>
   </p:clrMapOvr>
-  <p:timing>
-    <p:tnLst>
-      <p:par>
-        <p:cTn id="1" dur="indefinite" restart="never" nodeType="tmRoot"/>
-      </p:par>
-    </p:tnLst>
-  </p:timing>
 </p:sld>
 </file>
 
@@ -9737,18 +9512,13 @@
               <a:defRPr/>
             </a:pPr>
             <a:r>
-              <a:rPr lang="en-US" sz="3200" dirty="0" smtClean="0">
+              <a:rPr lang="en-US" sz="3200" dirty="0">
                 <a:solidFill>
                   <a:schemeClr val="tx2"/>
                 </a:solidFill>
               </a:rPr>
               <a:t>ARIMA Parameters, ACF and PACF</a:t>
             </a:r>
-            <a:endParaRPr lang="en-US" sz="3200" dirty="0">
-              <a:solidFill>
-                <a:schemeClr val="tx2"/>
-              </a:solidFill>
-            </a:endParaRPr>
           </a:p>
         </p:txBody>
       </p:sp>
@@ -9821,7 +9591,7 @@
               <a:buAutoNum type="arabicPeriod"/>
             </a:pPr>
             <a:r>
-              <a:rPr lang="en-US" sz="2400" dirty="0" smtClean="0"/>
+              <a:rPr lang="en-US" sz="2400" dirty="0"/>
               <a:t>So we are going to have to difference the ad spend variable.  Let’s do that now!</a:t>
             </a:r>
           </a:p>
@@ -9924,13 +9694,6 @@
   <p:clrMapOvr>
     <a:masterClrMapping/>
   </p:clrMapOvr>
-  <p:timing>
-    <p:tnLst>
-      <p:par>
-        <p:cTn id="1" dur="indefinite" restart="never" nodeType="tmRoot"/>
-      </p:par>
-    </p:tnLst>
-  </p:timing>
 </p:sld>
 </file>
 
@@ -10003,18 +9766,13 @@
               <a:defRPr/>
             </a:pPr>
             <a:r>
-              <a:rPr lang="en-US" sz="3200" dirty="0" smtClean="0">
+              <a:rPr lang="en-US" sz="3200" dirty="0">
                 <a:solidFill>
                   <a:schemeClr val="tx2"/>
                 </a:solidFill>
               </a:rPr>
               <a:t>ARIMA Parameters, ACF and PACF</a:t>
             </a:r>
-            <a:endParaRPr lang="en-US" sz="3200" dirty="0">
-              <a:solidFill>
-                <a:schemeClr val="tx2"/>
-              </a:solidFill>
-            </a:endParaRPr>
           </a:p>
         </p:txBody>
       </p:sp>
@@ -10087,7 +9845,7 @@
               <a:buAutoNum type="arabicPeriod"/>
             </a:pPr>
             <a:r>
-              <a:rPr lang="en-US" sz="2400" dirty="0" smtClean="0"/>
+              <a:rPr lang="en-US" sz="2400" dirty="0"/>
               <a:t>There is the differenced variable now! </a:t>
             </a:r>
           </a:p>
@@ -10190,13 +9948,6 @@
   <p:clrMapOvr>
     <a:masterClrMapping/>
   </p:clrMapOvr>
-  <p:timing>
-    <p:tnLst>
-      <p:par>
-        <p:cTn id="1" dur="indefinite" restart="never" nodeType="tmRoot"/>
-      </p:par>
-    </p:tnLst>
-  </p:timing>
 </p:sld>
 </file>
 
@@ -10269,18 +10020,13 @@
               <a:defRPr/>
             </a:pPr>
             <a:r>
-              <a:rPr lang="en-US" sz="3200" dirty="0" smtClean="0">
+              <a:rPr lang="en-US" sz="3200" dirty="0">
                 <a:solidFill>
                   <a:schemeClr val="tx2"/>
                 </a:solidFill>
               </a:rPr>
               <a:t>ARIMA Parameters, ACF and PACF</a:t>
             </a:r>
-            <a:endParaRPr lang="en-US" sz="3200" dirty="0">
-              <a:solidFill>
-                <a:schemeClr val="tx2"/>
-              </a:solidFill>
-            </a:endParaRPr>
           </a:p>
         </p:txBody>
       </p:sp>
@@ -10354,10 +10100,9 @@
               <a:buAutoNum type="arabicPeriod"/>
             </a:pPr>
             <a:r>
-              <a:rPr lang="en-US" sz="2400" dirty="0" smtClean="0"/>
+              <a:rPr lang="en-US" sz="2400" dirty="0"/>
               <a:t>Let’s use our Mark I eyeball to see if the trend went away in our differenced variable? </a:t>
             </a:r>
-            <a:endParaRPr lang="en-US" sz="2400" dirty="0"/>
           </a:p>
           <a:p>
             <a:pPr marL="514350" indent="-514350">
@@ -10462,13 +10207,6 @@
   <p:clrMapOvr>
     <a:masterClrMapping/>
   </p:clrMapOvr>
-  <p:timing>
-    <p:tnLst>
-      <p:par>
-        <p:cTn id="1" dur="indefinite" restart="never" nodeType="tmRoot"/>
-      </p:par>
-    </p:tnLst>
-  </p:timing>
 </p:sld>
 </file>
 
@@ -10541,18 +10279,13 @@
               <a:defRPr/>
             </a:pPr>
             <a:r>
-              <a:rPr lang="en-US" sz="3200" dirty="0" smtClean="0">
+              <a:rPr lang="en-US" sz="3200" dirty="0">
                 <a:solidFill>
                   <a:schemeClr val="tx2"/>
                 </a:solidFill>
               </a:rPr>
               <a:t>ARIMA Parameters, ACF and PACF</a:t>
             </a:r>
-            <a:endParaRPr lang="en-US" sz="3200" dirty="0">
-              <a:solidFill>
-                <a:schemeClr val="tx2"/>
-              </a:solidFill>
-            </a:endParaRPr>
           </a:p>
         </p:txBody>
       </p:sp>
@@ -10625,14 +10358,9 @@
               <a:buAutoNum type="arabicPeriod"/>
             </a:pPr>
             <a:r>
-              <a:rPr lang="en-US" sz="2400" dirty="0" smtClean="0"/>
-              <a:t>What does our ACF look like for our differenced ad spend data?  The skis slope pattern is gone</a:t>
-            </a:r>
-            <a:r>
-              <a:rPr lang="en-US" sz="2400" dirty="0" smtClean="0"/>
-              <a:t>!  Now it looks more like the “flip flop” pattern we would suggest where there is a constant mean.</a:t>
-            </a:r>
-            <a:endParaRPr lang="en-US" sz="2400" dirty="0" smtClean="0"/>
+              <a:rPr lang="en-US" sz="2400" dirty="0"/>
+              <a:t>What does our ACF look like for our differenced ad spend data?  The skis slope pattern is gone!  Now it looks more like the “flip flop” pattern we would suggest where there is a constant mean.</a:t>
+            </a:r>
           </a:p>
           <a:p>
             <a:pPr marL="514350" indent="-514350">
@@ -10715,13 +10443,6 @@
   <p:clrMapOvr>
     <a:masterClrMapping/>
   </p:clrMapOvr>
-  <p:timing>
-    <p:tnLst>
-      <p:par>
-        <p:cTn id="1" dur="indefinite" restart="never" nodeType="tmRoot"/>
-      </p:par>
-    </p:tnLst>
-  </p:timing>
 </p:sld>
 </file>
 
@@ -10794,18 +10515,13 @@
               <a:defRPr/>
             </a:pPr>
             <a:r>
-              <a:rPr lang="en-US" sz="3200" dirty="0" smtClean="0">
+              <a:rPr lang="en-US" sz="3200" dirty="0">
                 <a:solidFill>
                   <a:schemeClr val="tx2"/>
                 </a:solidFill>
               </a:rPr>
               <a:t>ARIMA Parameters, ACF and PACF</a:t>
             </a:r>
-            <a:endParaRPr lang="en-US" sz="3200" dirty="0">
-              <a:solidFill>
-                <a:schemeClr val="tx2"/>
-              </a:solidFill>
-            </a:endParaRPr>
           </a:p>
         </p:txBody>
       </p:sp>
@@ -10878,10 +10594,9 @@
               <a:buAutoNum type="arabicPeriod"/>
             </a:pPr>
             <a:r>
-              <a:rPr lang="en-US" sz="2400" dirty="0" smtClean="0"/>
+              <a:rPr lang="en-US" sz="2400" dirty="0"/>
               <a:t>Let’s look at the Augmented Dickey Fuller (ADF) and KPSS tests and see if the trend is gone.  Yes it is!</a:t>
             </a:r>
-            <a:endParaRPr lang="en-US" sz="2400" dirty="0"/>
           </a:p>
           <a:p>
             <a:pPr marL="514350" indent="-514350">
@@ -10988,13 +10703,6 @@
   <p:clrMapOvr>
     <a:masterClrMapping/>
   </p:clrMapOvr>
-  <p:timing>
-    <p:tnLst>
-      <p:par>
-        <p:cTn id="1" dur="indefinite" restart="never" nodeType="tmRoot"/>
-      </p:par>
-    </p:tnLst>
-  </p:timing>
 </p:sld>
 </file>
 
@@ -11062,7 +10770,7 @@
               <a:defRPr/>
             </a:pPr>
             <a:r>
-              <a:rPr kumimoji="0" lang="en-US" sz="3200" b="0" i="0" u="none" strike="noStrike" kern="1200" cap="none" spc="0" normalizeH="0" baseline="0" noProof="0" dirty="0" smtClean="0">
+              <a:rPr kumimoji="0" lang="en-US" sz="3200" b="0" i="0" u="none" strike="noStrike" kern="1200" cap="none" spc="0" normalizeH="0" baseline="0" noProof="0" dirty="0">
                 <a:ln>
                   <a:noFill/>
                 </a:ln>
@@ -11078,20 +10786,6 @@
               </a:rPr>
               <a:t>Step 1:  Nature of Time Series</a:t>
             </a:r>
-            <a:endParaRPr kumimoji="0" lang="en-US" sz="3200" b="0" i="0" u="none" strike="noStrike" kern="1200" cap="none" spc="0" normalizeH="0" baseline="0" noProof="0" dirty="0">
-              <a:ln>
-                <a:noFill/>
-              </a:ln>
-              <a:solidFill>
-                <a:schemeClr val="tx2"/>
-              </a:solidFill>
-              <a:effectLst/>
-              <a:uLnTx/>
-              <a:uFillTx/>
-              <a:latin typeface="+mj-lt"/>
-              <a:ea typeface="+mj-ea"/>
-              <a:cs typeface="+mj-cs"/>
-            </a:endParaRPr>
           </a:p>
         </p:txBody>
       </p:sp>
@@ -11173,11 +10867,11 @@
               <a:buAutoNum type="arabicPeriod"/>
             </a:pPr>
             <a:r>
-              <a:rPr lang="en-US" b="1" dirty="0" smtClean="0"/>
+              <a:rPr lang="en-US" b="1" dirty="0"/>
               <a:t>Example 1:  </a:t>
             </a:r>
             <a:r>
-              <a:rPr lang="en-US" dirty="0" smtClean="0"/>
+              <a:rPr lang="en-US" dirty="0"/>
               <a:t>Skitters weight control company has data on its monthly sales for the last 3 years.  Company officials want to know if you can model that data and predict the next 12 months of sales.</a:t>
             </a:r>
           </a:p>
@@ -11385,7 +11079,7 @@
               <a:buFont typeface="Wingdings 2"/>
               <a:buAutoNum type="arabicPeriod"/>
             </a:pPr>
-            <a:endParaRPr lang="en-US" b="1" dirty="0" smtClean="0"/>
+            <a:endParaRPr lang="en-US" b="1" dirty="0"/>
           </a:p>
         </p:txBody>
       </p:sp>
@@ -11394,13 +11088,6 @@
   <p:clrMapOvr>
     <a:masterClrMapping/>
   </p:clrMapOvr>
-  <p:timing>
-    <p:tnLst>
-      <p:par>
-        <p:cTn id="1" dur="indefinite" restart="never" nodeType="tmRoot"/>
-      </p:par>
-    </p:tnLst>
-  </p:timing>
 </p:sld>
 </file>
 
@@ -11473,18 +11160,13 @@
               <a:defRPr/>
             </a:pPr>
             <a:r>
-              <a:rPr lang="en-US" sz="3200" dirty="0" smtClean="0">
+              <a:rPr lang="en-US" sz="3200" dirty="0">
                 <a:solidFill>
                   <a:schemeClr val="tx2"/>
                 </a:solidFill>
               </a:rPr>
               <a:t>ARIMA Parameters, ACF and PACF</a:t>
             </a:r>
-            <a:endParaRPr lang="en-US" sz="3200" dirty="0">
-              <a:solidFill>
-                <a:schemeClr val="tx2"/>
-              </a:solidFill>
-            </a:endParaRPr>
           </a:p>
         </p:txBody>
       </p:sp>
@@ -11557,10 +11239,9 @@
               <a:buAutoNum type="arabicPeriod"/>
             </a:pPr>
             <a:r>
-              <a:rPr lang="en-US" sz="2400" dirty="0" smtClean="0"/>
+              <a:rPr lang="en-US" sz="2400" dirty="0"/>
               <a:t>Now we can move on to Part 2 of the ARIMA analysis process!</a:t>
             </a:r>
-            <a:endParaRPr lang="en-US" sz="2400" dirty="0"/>
           </a:p>
           <a:p>
             <a:pPr marL="514350" indent="-514350">
@@ -11682,13 +11363,6 @@
   <p:clrMapOvr>
     <a:masterClrMapping/>
   </p:clrMapOvr>
-  <p:timing>
-    <p:tnLst>
-      <p:par>
-        <p:cTn id="1" dur="indefinite" restart="never" nodeType="tmRoot"/>
-      </p:par>
-    </p:tnLst>
-  </p:timing>
 </p:sld>
 </file>
 
@@ -11756,7 +11430,7 @@
               <a:defRPr/>
             </a:pPr>
             <a:r>
-              <a:rPr kumimoji="0" lang="en-US" sz="3200" b="0" i="0" u="none" strike="noStrike" kern="1200" cap="none" spc="0" normalizeH="0" baseline="0" noProof="0" dirty="0" smtClean="0">
+              <a:rPr kumimoji="0" lang="en-US" sz="3200" b="0" i="0" u="none" strike="noStrike" kern="1200" cap="none" spc="0" normalizeH="0" baseline="0" noProof="0" dirty="0">
                 <a:ln>
                   <a:noFill/>
                 </a:ln>
@@ -11773,7 +11447,7 @@
               <a:t>Step 7:  Sample Size</a:t>
             </a:r>
             <a:r>
-              <a:rPr kumimoji="0" lang="en-US" sz="3200" b="0" i="0" u="none" strike="noStrike" kern="1200" cap="none" spc="0" normalizeH="0" noProof="0" dirty="0" smtClean="0">
+              <a:rPr kumimoji="0" lang="en-US" sz="3200" b="0" i="0" u="none" strike="noStrike" kern="1200" cap="none" spc="0" normalizeH="0" noProof="0" dirty="0">
                 <a:ln>
                   <a:noFill/>
                 </a:ln>
@@ -11875,7 +11549,7 @@
               <a:buAutoNum type="arabicPeriod"/>
             </a:pPr>
             <a:r>
-              <a:rPr lang="en-US" dirty="0" smtClean="0"/>
+              <a:rPr lang="en-US" dirty="0"/>
               <a:t>Most stat textbooks recommend a minimum of 50 observations for working on time series models…</a:t>
             </a:r>
           </a:p>
@@ -11886,7 +11560,7 @@
               </a:spcBef>
               <a:buNone/>
             </a:pPr>
-            <a:endParaRPr lang="en-US" b="1" dirty="0" smtClean="0"/>
+            <a:endParaRPr lang="en-US" b="1" dirty="0"/>
           </a:p>
           <a:p>
             <a:pPr marL="514350" indent="-514350">
@@ -11897,10 +11571,9 @@
               <a:buAutoNum type="arabicPeriod"/>
             </a:pPr>
             <a:r>
-              <a:rPr lang="en-US" dirty="0" smtClean="0"/>
+              <a:rPr lang="en-US" dirty="0"/>
               <a:t>Technically discussions of power and time series often do not mix very easily.  The more cases one has (see #1 above) the more power the ARIMA model will have to find statistically significant AR and MA processes.</a:t>
             </a:r>
-            <a:endParaRPr lang="en-US" dirty="0"/>
           </a:p>
         </p:txBody>
       </p:sp>
@@ -11914,13 +11587,6 @@
   <p:clrMapOvr>
     <a:masterClrMapping/>
   </p:clrMapOvr>
-  <p:timing>
-    <p:tnLst>
-      <p:par>
-        <p:cTn id="1" dur="indefinite" restart="never" nodeType="tmRoot"/>
-      </p:par>
-    </p:tnLst>
-  </p:timing>
 </p:sld>
 </file>
 
@@ -11988,7 +11654,7 @@
               <a:defRPr/>
             </a:pPr>
             <a:r>
-              <a:rPr kumimoji="0" lang="en-US" sz="3200" b="0" i="0" u="none" strike="noStrike" kern="1200" cap="none" spc="0" normalizeH="0" baseline="0" noProof="0" dirty="0" smtClean="0">
+              <a:rPr kumimoji="0" lang="en-US" sz="3200" b="0" i="0" u="none" strike="noStrike" kern="1200" cap="none" spc="0" normalizeH="0" baseline="0" noProof="0" dirty="0">
                 <a:ln>
                   <a:noFill/>
                 </a:ln>
@@ -12004,20 +11670,6 @@
               </a:rPr>
               <a:t>Step 8:  Assumptions of the Test</a:t>
             </a:r>
-            <a:endParaRPr kumimoji="0" lang="en-US" sz="3200" b="0" i="0" u="none" strike="noStrike" kern="1200" cap="none" spc="0" normalizeH="0" baseline="0" noProof="0" dirty="0">
-              <a:ln>
-                <a:noFill/>
-              </a:ln>
-              <a:solidFill>
-                <a:schemeClr val="tx2"/>
-              </a:solidFill>
-              <a:effectLst/>
-              <a:uLnTx/>
-              <a:uFillTx/>
-              <a:latin typeface="+mj-lt"/>
-              <a:ea typeface="+mj-ea"/>
-              <a:cs typeface="+mj-cs"/>
-            </a:endParaRPr>
           </a:p>
         </p:txBody>
       </p:sp>
@@ -12090,7 +11742,7 @@
               <a:buNone/>
             </a:pPr>
             <a:r>
-              <a:rPr lang="en-US" dirty="0" smtClean="0"/>
+              <a:rPr lang="en-US" dirty="0"/>
               <a:t>The two most classic assumptions of ARIMA models are:</a:t>
             </a:r>
           </a:p>
@@ -12111,7 +11763,7 @@
               <a:buAutoNum type="arabicPeriod"/>
             </a:pPr>
             <a:r>
-              <a:rPr lang="en-US" dirty="0" smtClean="0"/>
+              <a:rPr lang="en-US" dirty="0"/>
               <a:t>The time series data is at least weakly stationary</a:t>
             </a:r>
           </a:p>
@@ -12123,7 +11775,7 @@
               <a:buAutoNum type="arabicPeriod"/>
             </a:pPr>
             <a:r>
-              <a:rPr lang="en-US" dirty="0" smtClean="0"/>
+              <a:rPr lang="en-US" dirty="0"/>
               <a:t>Constant mean over time</a:t>
             </a:r>
           </a:p>
@@ -12135,7 +11787,7 @@
               <a:buAutoNum type="arabicPeriod"/>
             </a:pPr>
             <a:r>
-              <a:rPr lang="en-US" dirty="0" smtClean="0"/>
+              <a:rPr lang="en-US" dirty="0"/>
               <a:t>Constant variance over time</a:t>
             </a:r>
           </a:p>
@@ -12146,7 +11798,7 @@
               </a:spcBef>
               <a:buAutoNum type="arabicPeriod"/>
             </a:pPr>
-            <a:endParaRPr lang="en-US" dirty="0" smtClean="0"/>
+            <a:endParaRPr lang="en-US" dirty="0"/>
           </a:p>
           <a:p>
             <a:pPr marL="514350" indent="-514350">
@@ -12156,11 +11808,11 @@
               <a:buAutoNum type="arabicPeriod"/>
             </a:pPr>
             <a:r>
-              <a:rPr lang="en-US" dirty="0" err="1" smtClean="0"/>
+              <a:rPr lang="en-US" dirty="0" err="1"/>
               <a:t>Homoskedasticity</a:t>
             </a:r>
             <a:r>
-              <a:rPr lang="en-US" dirty="0" smtClean="0"/>
+              <a:rPr lang="en-US" dirty="0"/>
               <a:t> of residuals</a:t>
             </a:r>
           </a:p>
@@ -12180,7 +11832,7 @@
               </a:spcBef>
               <a:buAutoNum type="arabicPeriod"/>
             </a:pPr>
-            <a:endParaRPr lang="en-US" dirty="0" smtClean="0"/>
+            <a:endParaRPr lang="en-US" dirty="0"/>
           </a:p>
         </p:txBody>
       </p:sp>
@@ -12194,13 +11846,6 @@
   <p:clrMapOvr>
     <a:masterClrMapping/>
   </p:clrMapOvr>
-  <p:timing>
-    <p:tnLst>
-      <p:par>
-        <p:cTn id="1" dur="indefinite" restart="never" nodeType="tmRoot"/>
-      </p:par>
-    </p:tnLst>
-  </p:timing>
 </p:sld>
 </file>
 
@@ -12268,7 +11913,7 @@
               <a:defRPr/>
             </a:pPr>
             <a:r>
-              <a:rPr kumimoji="0" lang="en-US" sz="3200" b="0" i="0" u="none" strike="noStrike" kern="1200" cap="none" spc="0" normalizeH="0" baseline="0" noProof="0" dirty="0" smtClean="0">
+              <a:rPr kumimoji="0" lang="en-US" sz="3200" b="0" i="0" u="none" strike="noStrike" kern="1200" cap="none" spc="0" normalizeH="0" baseline="0" noProof="0" dirty="0">
                 <a:ln>
                   <a:noFill/>
                 </a:ln>
@@ -12284,20 +11929,6 @@
               </a:rPr>
               <a:t>Step 9:  Notes</a:t>
             </a:r>
-            <a:endParaRPr kumimoji="0" lang="en-US" sz="3200" b="0" i="0" u="none" strike="noStrike" kern="1200" cap="none" spc="0" normalizeH="0" baseline="0" noProof="0" dirty="0">
-              <a:ln>
-                <a:noFill/>
-              </a:ln>
-              <a:solidFill>
-                <a:schemeClr val="tx2"/>
-              </a:solidFill>
-              <a:effectLst/>
-              <a:uLnTx/>
-              <a:uFillTx/>
-              <a:latin typeface="+mj-lt"/>
-              <a:ea typeface="+mj-ea"/>
-              <a:cs typeface="+mj-cs"/>
-            </a:endParaRPr>
           </a:p>
         </p:txBody>
       </p:sp>
@@ -12370,7 +12001,7 @@
               <a:buAutoNum type="arabicPeriod"/>
             </a:pPr>
             <a:r>
-              <a:rPr lang="en-US" dirty="0" smtClean="0"/>
+              <a:rPr lang="en-US" dirty="0"/>
               <a:t>Note that the interpretation of the ACF and PACF are subjective to some degree.  Note that in my example I ignored the seasonality component of sales in those diagnostic plots.  There is a non-trivial amount of discretion often involved in forming some types of time series models.</a:t>
             </a:r>
           </a:p>
@@ -12381,7 +12012,7 @@
               </a:spcBef>
               <a:buAutoNum type="arabicPeriod"/>
             </a:pPr>
-            <a:endParaRPr lang="en-US" dirty="0" smtClean="0"/>
+            <a:endParaRPr lang="en-US" dirty="0"/>
           </a:p>
           <a:p>
             <a:pPr marL="514350" indent="-514350">
@@ -12391,7 +12022,7 @@
               <a:buAutoNum type="arabicPeriod"/>
             </a:pPr>
             <a:r>
-              <a:rPr lang="en-US" dirty="0" smtClean="0"/>
+              <a:rPr lang="en-US" dirty="0"/>
               <a:t>There are other software packages (the freeware GRETL for example) that have more complex time series models available</a:t>
             </a:r>
           </a:p>
@@ -12444,13 +12075,6 @@
   <p:clrMapOvr>
     <a:masterClrMapping/>
   </p:clrMapOvr>
-  <p:timing>
-    <p:tnLst>
-      <p:par>
-        <p:cTn id="1" dur="indefinite" restart="never" nodeType="tmRoot"/>
-      </p:par>
-    </p:tnLst>
-  </p:timing>
 </p:sld>
 </file>
 
@@ -12518,7 +12142,7 @@
               <a:defRPr/>
             </a:pPr>
             <a:r>
-              <a:rPr kumimoji="0" lang="en-US" sz="3200" b="0" i="0" u="none" strike="noStrike" kern="1200" cap="none" spc="0" normalizeH="0" baseline="0" noProof="0" dirty="0" smtClean="0">
+              <a:rPr kumimoji="0" lang="en-US" sz="3200" b="0" i="0" u="none" strike="noStrike" kern="1200" cap="none" spc="0" normalizeH="0" baseline="0" noProof="0" dirty="0">
                 <a:ln>
                   <a:noFill/>
                 </a:ln>
@@ -12534,20 +12158,6 @@
               </a:rPr>
               <a:t>Step 1:  Nature of Time Series</a:t>
             </a:r>
-            <a:endParaRPr kumimoji="0" lang="en-US" sz="3200" b="0" i="0" u="none" strike="noStrike" kern="1200" cap="none" spc="0" normalizeH="0" baseline="0" noProof="0" dirty="0">
-              <a:ln>
-                <a:noFill/>
-              </a:ln>
-              <a:solidFill>
-                <a:schemeClr val="tx2"/>
-              </a:solidFill>
-              <a:effectLst/>
-              <a:uLnTx/>
-              <a:uFillTx/>
-              <a:latin typeface="+mj-lt"/>
-              <a:ea typeface="+mj-ea"/>
-              <a:cs typeface="+mj-cs"/>
-            </a:endParaRPr>
           </a:p>
         </p:txBody>
       </p:sp>
@@ -12629,11 +12239,11 @@
               <a:buAutoNum type="arabicPeriod"/>
             </a:pPr>
             <a:r>
-              <a:rPr lang="en-US" b="1" dirty="0" smtClean="0"/>
+              <a:rPr lang="en-US" b="1" dirty="0"/>
               <a:t>Example 2:  </a:t>
             </a:r>
             <a:r>
-              <a:rPr lang="en-US" dirty="0" smtClean="0"/>
+              <a:rPr lang="en-US" dirty="0"/>
               <a:t>Skitters weight control has 3 years of advertising costs and wants to know what you think next years advertising costs might look like.</a:t>
             </a:r>
           </a:p>
@@ -12841,7 +12451,7 @@
               <a:buFont typeface="Wingdings 2"/>
               <a:buAutoNum type="arabicPeriod"/>
             </a:pPr>
-            <a:endParaRPr lang="en-US" b="1" dirty="0" smtClean="0"/>
+            <a:endParaRPr lang="en-US" b="1" dirty="0"/>
           </a:p>
         </p:txBody>
       </p:sp>
@@ -12855,13 +12465,6 @@
   <p:clrMapOvr>
     <a:masterClrMapping/>
   </p:clrMapOvr>
-  <p:timing>
-    <p:tnLst>
-      <p:par>
-        <p:cTn id="1" dur="indefinite" restart="never" nodeType="tmRoot"/>
-      </p:par>
-    </p:tnLst>
-  </p:timing>
 </p:sld>
 </file>
 
@@ -12929,7 +12532,7 @@
               <a:defRPr/>
             </a:pPr>
             <a:r>
-              <a:rPr kumimoji="0" lang="en-US" sz="3200" b="0" i="0" u="none" strike="noStrike" kern="1200" cap="none" spc="0" normalizeH="0" baseline="0" noProof="0" dirty="0" smtClean="0">
+              <a:rPr kumimoji="0" lang="en-US" sz="3200" b="0" i="0" u="none" strike="noStrike" kern="1200" cap="none" spc="0" normalizeH="0" baseline="0" noProof="0" dirty="0">
                 <a:ln>
                   <a:noFill/>
                 </a:ln>
@@ -12945,20 +12548,6 @@
               </a:rPr>
               <a:t>Step 1:  Nature of Time Series</a:t>
             </a:r>
-            <a:endParaRPr kumimoji="0" lang="en-US" sz="3200" b="0" i="0" u="none" strike="noStrike" kern="1200" cap="none" spc="0" normalizeH="0" baseline="0" noProof="0" dirty="0">
-              <a:ln>
-                <a:noFill/>
-              </a:ln>
-              <a:solidFill>
-                <a:schemeClr val="tx2"/>
-              </a:solidFill>
-              <a:effectLst/>
-              <a:uLnTx/>
-              <a:uFillTx/>
-              <a:latin typeface="+mj-lt"/>
-              <a:ea typeface="+mj-ea"/>
-              <a:cs typeface="+mj-cs"/>
-            </a:endParaRPr>
           </a:p>
         </p:txBody>
       </p:sp>
@@ -13040,11 +12629,11 @@
               <a:buAutoNum type="arabicPeriod"/>
             </a:pPr>
             <a:r>
-              <a:rPr lang="en-US" b="1" dirty="0" smtClean="0"/>
+              <a:rPr lang="en-US" b="1" dirty="0"/>
               <a:t>Example 3:  </a:t>
             </a:r>
             <a:r>
-              <a:rPr lang="en-US" dirty="0" smtClean="0"/>
+              <a:rPr lang="en-US" dirty="0"/>
               <a:t>Skitters weight control has 3 years of advertising costs and sales  and wants to get a better idea of the relationship between the two, as well as forecast this relationship into the next 12 months.</a:t>
             </a:r>
           </a:p>
@@ -13252,7 +12841,7 @@
               <a:buFont typeface="Wingdings 2"/>
               <a:buAutoNum type="arabicPeriod"/>
             </a:pPr>
-            <a:endParaRPr lang="en-US" b="1" dirty="0" smtClean="0"/>
+            <a:endParaRPr lang="en-US" b="1" dirty="0"/>
           </a:p>
         </p:txBody>
       </p:sp>
@@ -13266,13 +12855,6 @@
   <p:clrMapOvr>
     <a:masterClrMapping/>
   </p:clrMapOvr>
-  <p:timing>
-    <p:tnLst>
-      <p:par>
-        <p:cTn id="1" dur="indefinite" restart="never" nodeType="tmRoot"/>
-      </p:par>
-    </p:tnLst>
-  </p:timing>
 </p:sld>
 </file>
 
@@ -13317,13 +12899,13 @@
           <a:p>
             <a:pPr eaLnBrk="1" hangingPunct="1"/>
             <a:r>
-              <a:rPr lang="en-US" sz="4800" dirty="0" smtClean="0"/>
+              <a:rPr lang="en-US" sz="4800" dirty="0"/>
               <a:t> Analytical Tools </a:t>
             </a:r>
             <a:br>
-              <a:rPr lang="en-US" sz="4800" dirty="0" smtClean="0"/>
+              <a:rPr lang="en-US" sz="4800" dirty="0"/>
             </a:br>
-            <a:endParaRPr lang="en-US" sz="2700" dirty="0" smtClean="0"/>
+            <a:endParaRPr lang="en-US" sz="2700" dirty="0"/>
           </a:p>
         </p:txBody>
       </p:sp>
@@ -13363,13 +12945,6 @@
   <p:clrMapOvr>
     <a:masterClrMapping/>
   </p:clrMapOvr>
-  <p:timing>
-    <p:tnLst>
-      <p:par>
-        <p:cTn id="1" dur="indefinite" restart="never" nodeType="tmRoot"/>
-      </p:par>
-    </p:tnLst>
-  </p:timing>
 </p:sld>
 </file>
 
@@ -13437,7 +13012,7 @@
               <a:defRPr/>
             </a:pPr>
             <a:r>
-              <a:rPr kumimoji="0" lang="en-US" sz="3200" b="0" i="0" u="none" strike="noStrike" kern="1200" cap="none" spc="0" normalizeH="0" baseline="0" noProof="0" dirty="0" smtClean="0">
+              <a:rPr kumimoji="0" lang="en-US" sz="3200" b="0" i="0" u="none" strike="noStrike" kern="1200" cap="none" spc="0" normalizeH="0" baseline="0" noProof="0" dirty="0">
                 <a:ln>
                   <a:noFill/>
                 </a:ln>
@@ -13454,7 +13029,7 @@
               <a:t>Step 1:  </a:t>
             </a:r>
             <a:r>
-              <a:rPr lang="en-US" sz="3200" dirty="0" smtClean="0">
+              <a:rPr lang="en-US" sz="3200" dirty="0">
                 <a:solidFill>
                   <a:schemeClr val="tx2"/>
                 </a:solidFill>
@@ -13551,11 +13126,7 @@
             </a:pPr>
             <a:r>
               <a:rPr lang="en-US" dirty="0"/>
-              <a:t>T</a:t>
-            </a:r>
-            <a:r>
-              <a:rPr lang="en-US" dirty="0" smtClean="0"/>
-              <a:t>ime series analytics brought to you today by GRETL</a:t>
+              <a:t>Time series analytics brought to you today by GRETL</a:t>
             </a:r>
           </a:p>
           <a:p>
@@ -13565,7 +13136,7 @@
               </a:spcBef>
               <a:buAutoNum type="arabicPeriod"/>
             </a:pPr>
-            <a:endParaRPr lang="en-US" dirty="0" smtClean="0"/>
+            <a:endParaRPr lang="en-US" dirty="0"/>
           </a:p>
           <a:p>
             <a:pPr marL="514350" indent="-514350">
@@ -13593,10 +13164,9 @@
               <a:buAutoNum type="arabicPeriod"/>
             </a:pPr>
             <a:r>
-              <a:rPr lang="en-US" dirty="0" smtClean="0"/>
+              <a:rPr lang="en-US" dirty="0"/>
               <a:t>Other time series platforms</a:t>
             </a:r>
-            <a:endParaRPr lang="en-US" dirty="0"/>
           </a:p>
           <a:p>
             <a:pPr marL="0" indent="0">
@@ -13811,7 +13381,7 @@
               <a:buFont typeface="Wingdings 2"/>
               <a:buAutoNum type="arabicPeriod"/>
             </a:pPr>
-            <a:endParaRPr lang="en-US" b="1" dirty="0" smtClean="0"/>
+            <a:endParaRPr lang="en-US" b="1" dirty="0"/>
           </a:p>
         </p:txBody>
       </p:sp>
@@ -13975,13 +13545,6 @@
   <p:clrMapOvr>
     <a:masterClrMapping/>
   </p:clrMapOvr>
-  <p:timing>
-    <p:tnLst>
-      <p:par>
-        <p:cTn id="1" dur="indefinite" restart="never" nodeType="tmRoot"/>
-      </p:par>
-    </p:tnLst>
-  </p:timing>
 </p:sld>
 </file>
 
@@ -14026,13 +13589,13 @@
           <a:p>
             <a:pPr eaLnBrk="1" hangingPunct="1"/>
             <a:r>
-              <a:rPr lang="en-US" sz="4800" dirty="0" smtClean="0"/>
+              <a:rPr lang="en-US" sz="4800" dirty="0"/>
               <a:t> Typical Use, Data Sniff and IDRE</a:t>
             </a:r>
             <a:br>
-              <a:rPr lang="en-US" sz="4800" dirty="0" smtClean="0"/>
+              <a:rPr lang="en-US" sz="4800" dirty="0"/>
             </a:br>
-            <a:endParaRPr lang="en-US" sz="2700" dirty="0" smtClean="0"/>
+            <a:endParaRPr lang="en-US" sz="2700" dirty="0"/>
           </a:p>
         </p:txBody>
       </p:sp>
@@ -14072,13 +13635,6 @@
   <p:clrMapOvr>
     <a:masterClrMapping/>
   </p:clrMapOvr>
-  <p:timing>
-    <p:tnLst>
-      <p:par>
-        <p:cTn id="1" dur="indefinite" restart="never" nodeType="tmRoot"/>
-      </p:par>
-    </p:tnLst>
-  </p:timing>
 </p:sld>
 </file>
 
@@ -14146,7 +13702,7 @@
               <a:defRPr/>
             </a:pPr>
             <a:r>
-              <a:rPr lang="en-US" sz="3200" dirty="0" smtClean="0">
+              <a:rPr lang="en-US" sz="3200" dirty="0">
                 <a:solidFill>
                   <a:schemeClr val="tx2"/>
                 </a:solidFill>
@@ -14242,7 +13798,7 @@
               <a:buAutoNum type="arabicPeriod"/>
             </a:pPr>
             <a:r>
-              <a:rPr lang="en-US" sz="2400" dirty="0" smtClean="0"/>
+              <a:rPr lang="en-US" sz="2400" dirty="0"/>
               <a:t>Time series data in companies is often is found in Excel spreadsheets so you can use GRETL to read in these data sets.</a:t>
             </a:r>
           </a:p>
@@ -14263,7 +13819,7 @@
               <a:buAutoNum type="arabicPeriod"/>
             </a:pPr>
             <a:r>
-              <a:rPr lang="en-US" sz="2400" dirty="0" smtClean="0"/>
+              <a:rPr lang="en-US" sz="2400" dirty="0"/>
               <a:t>Note that GRETL as well as most of the other platforms mentioned are a bit persnickety about time fields.</a:t>
             </a:r>
           </a:p>
@@ -14283,7 +13839,7 @@
               </a:spcBef>
               <a:buAutoNum type="arabicPeriod"/>
             </a:pPr>
-            <a:endParaRPr lang="en-US" sz="1800" dirty="0" smtClean="0"/>
+            <a:endParaRPr lang="en-US" sz="1800" dirty="0"/>
           </a:p>
           <a:p>
             <a:pPr marL="788670" lvl="1" indent="-514350">
@@ -14310,7 +13866,7 @@
               </a:spcBef>
               <a:buAutoNum type="arabicPeriod"/>
             </a:pPr>
-            <a:endParaRPr lang="en-US" dirty="0" smtClean="0"/>
+            <a:endParaRPr lang="en-US" dirty="0"/>
           </a:p>
           <a:p>
             <a:pPr marL="514350" indent="-514350">
@@ -14319,7 +13875,7 @@
               </a:spcBef>
               <a:buAutoNum type="arabicPeriod"/>
             </a:pPr>
-            <a:endParaRPr lang="en-US" dirty="0" smtClean="0"/>
+            <a:endParaRPr lang="en-US" dirty="0"/>
           </a:p>
           <a:p>
             <a:pPr marL="514350" indent="-514350">
@@ -14337,7 +13893,7 @@
               </a:spcBef>
               <a:buAutoNum type="arabicPeriod"/>
             </a:pPr>
-            <a:endParaRPr lang="en-US" dirty="0" smtClean="0"/>
+            <a:endParaRPr lang="en-US" dirty="0"/>
           </a:p>
           <a:p>
             <a:pPr marL="514350" indent="-514350">
@@ -14346,7 +13902,7 @@
               </a:spcBef>
               <a:buAutoNum type="arabicPeriod"/>
             </a:pPr>
-            <a:endParaRPr lang="en-US" b="1" dirty="0" smtClean="0"/>
+            <a:endParaRPr lang="en-US" b="1" dirty="0"/>
           </a:p>
         </p:txBody>
       </p:sp>
@@ -14379,13 +13935,6 @@
   <p:clrMapOvr>
     <a:masterClrMapping/>
   </p:clrMapOvr>
-  <p:timing>
-    <p:tnLst>
-      <p:par>
-        <p:cTn id="1" dur="indefinite" restart="never" nodeType="tmRoot"/>
-      </p:par>
-    </p:tnLst>
-  </p:timing>
 </p:sld>
 </file>
 

</xml_diff>